<commit_message>
Updated training gameplan canvases
</commit_message>
<xml_diff>
--- a/canvas/Training_Gameplan.pptx
+++ b/canvas/Training_Gameplan.pptx
@@ -271,7 +271,7 @@
               <a:pPr>
                 <a:defRPr/>
               </a:pPr>
-              <a:t>8/22/18</a:t>
+              <a:t>9/12/18</a:t>
             </a:fld>
             <a:endParaRPr lang="en-US"/>
           </a:p>
@@ -495,7 +495,7 @@
               <a:pPr>
                 <a:defRPr/>
               </a:pPr>
-              <a:t>8/22/18</a:t>
+              <a:t>9/12/18</a:t>
             </a:fld>
             <a:endParaRPr lang="en-US"/>
           </a:p>
@@ -876,14 +876,14 @@
           </a:ln>
           <a:extLst>
             <a:ext uri="{909E8E84-426E-40dd-AFC4-6F175D3DCCD1}">
-              <a14:hiddenFill xmlns="" xmlns:a14="http://schemas.microsoft.com/office/drawing/2010/main">
+              <a14:hiddenFill xmlns:a14="http://schemas.microsoft.com/office/drawing/2010/main" xmlns="">
                 <a:solidFill>
                   <a:srgbClr val="FFFFFF"/>
                 </a:solidFill>
               </a14:hiddenFill>
             </a:ext>
             <a:ext uri="{91240B29-F687-4f45-9708-019B960494DF}">
-              <a14:hiddenLine xmlns="" xmlns:a14="http://schemas.microsoft.com/office/drawing/2010/main" w="9525">
+              <a14:hiddenLine xmlns:a14="http://schemas.microsoft.com/office/drawing/2010/main" xmlns="" w="9525">
                 <a:solidFill>
                   <a:srgbClr val="000000"/>
                 </a:solidFill>
@@ -930,14 +930,14 @@
           </a:ln>
           <a:extLst>
             <a:ext uri="{909E8E84-426E-40dd-AFC4-6F175D3DCCD1}">
-              <a14:hiddenFill xmlns="" xmlns:a14="http://schemas.microsoft.com/office/drawing/2010/main">
+              <a14:hiddenFill xmlns:a14="http://schemas.microsoft.com/office/drawing/2010/main" xmlns="">
                 <a:solidFill>
                   <a:srgbClr val="FFFFFF"/>
                 </a:solidFill>
               </a14:hiddenFill>
             </a:ext>
             <a:ext uri="{91240B29-F687-4f45-9708-019B960494DF}">
-              <a14:hiddenLine xmlns="" xmlns:a14="http://schemas.microsoft.com/office/drawing/2010/main" w="9525">
+              <a14:hiddenLine xmlns:a14="http://schemas.microsoft.com/office/drawing/2010/main" xmlns="" w="9525">
                 <a:solidFill>
                   <a:srgbClr val="000000"/>
                 </a:solidFill>
@@ -1048,7 +1048,7 @@
               <a:pPr>
                 <a:defRPr/>
               </a:pPr>
-              <a:t>22.8.2018</a:t>
+              <a:t>12.9.2018</a:t>
             </a:fld>
             <a:endParaRPr dirty="0"/>
           </a:p>
@@ -1135,14 +1135,14 @@
             </a:ln>
             <a:extLst>
               <a:ext uri="{909E8E84-426E-40dd-AFC4-6F175D3DCCD1}">
-                <a14:hiddenFill xmlns="" xmlns:a14="http://schemas.microsoft.com/office/drawing/2010/main">
+                <a14:hiddenFill xmlns:a14="http://schemas.microsoft.com/office/drawing/2010/main" xmlns="">
                   <a:solidFill>
                     <a:srgbClr val="FFFFFF"/>
                   </a:solidFill>
                 </a14:hiddenFill>
               </a:ext>
               <a:ext uri="{91240B29-F687-4f45-9708-019B960494DF}">
-                <a14:hiddenLine xmlns="" xmlns:a14="http://schemas.microsoft.com/office/drawing/2010/main" w="9525">
+                <a14:hiddenLine xmlns:a14="http://schemas.microsoft.com/office/drawing/2010/main" xmlns="" w="9525">
                   <a:solidFill>
                     <a:srgbClr val="000000"/>
                   </a:solidFill>
@@ -1246,14 +1246,14 @@
           </a:ln>
           <a:extLst>
             <a:ext uri="{909E8E84-426E-40dd-AFC4-6F175D3DCCD1}">
-              <a14:hiddenFill xmlns="" xmlns:a14="http://schemas.microsoft.com/office/drawing/2010/main">
+              <a14:hiddenFill xmlns:a14="http://schemas.microsoft.com/office/drawing/2010/main" xmlns="">
                 <a:solidFill>
                   <a:srgbClr val="FFFFFF"/>
                 </a:solidFill>
               </a14:hiddenFill>
             </a:ext>
             <a:ext uri="{91240B29-F687-4f45-9708-019B960494DF}">
-              <a14:hiddenLine xmlns="" xmlns:a14="http://schemas.microsoft.com/office/drawing/2010/main" w="9525">
+              <a14:hiddenLine xmlns:a14="http://schemas.microsoft.com/office/drawing/2010/main" xmlns="" w="9525">
                 <a:solidFill>
                   <a:srgbClr val="000000"/>
                 </a:solidFill>
@@ -1470,14 +1470,14 @@
             </a:ln>
             <a:extLst>
               <a:ext uri="{909E8E84-426E-40dd-AFC4-6F175D3DCCD1}">
-                <a14:hiddenFill xmlns="" xmlns:a14="http://schemas.microsoft.com/office/drawing/2010/main">
+                <a14:hiddenFill xmlns:a14="http://schemas.microsoft.com/office/drawing/2010/main" xmlns="">
                   <a:solidFill>
                     <a:srgbClr val="FFFFFF"/>
                   </a:solidFill>
                 </a14:hiddenFill>
               </a:ext>
               <a:ext uri="{91240B29-F687-4f45-9708-019B960494DF}">
-                <a14:hiddenLine xmlns="" xmlns:a14="http://schemas.microsoft.com/office/drawing/2010/main" w="9525">
+                <a14:hiddenLine xmlns:a14="http://schemas.microsoft.com/office/drawing/2010/main" xmlns="" w="9525">
                   <a:solidFill>
                     <a:srgbClr val="000000"/>
                   </a:solidFill>
@@ -1581,14 +1581,14 @@
           </a:ln>
           <a:extLst>
             <a:ext uri="{909E8E84-426E-40dd-AFC4-6F175D3DCCD1}">
-              <a14:hiddenFill xmlns="" xmlns:a14="http://schemas.microsoft.com/office/drawing/2010/main">
+              <a14:hiddenFill xmlns:a14="http://schemas.microsoft.com/office/drawing/2010/main" xmlns="">
                 <a:solidFill>
                   <a:srgbClr val="FFFFFF"/>
                 </a:solidFill>
               </a14:hiddenFill>
             </a:ext>
             <a:ext uri="{91240B29-F687-4f45-9708-019B960494DF}">
-              <a14:hiddenLine xmlns="" xmlns:a14="http://schemas.microsoft.com/office/drawing/2010/main" w="9525">
+              <a14:hiddenLine xmlns:a14="http://schemas.microsoft.com/office/drawing/2010/main" xmlns="" w="9525">
                 <a:solidFill>
                   <a:srgbClr val="000000"/>
                 </a:solidFill>
@@ -1665,14 +1665,14 @@
           </a:ln>
           <a:extLst>
             <a:ext uri="{909E8E84-426E-40dd-AFC4-6F175D3DCCD1}">
-              <a14:hiddenFill xmlns="" xmlns:a14="http://schemas.microsoft.com/office/drawing/2010/main">
+              <a14:hiddenFill xmlns:a14="http://schemas.microsoft.com/office/drawing/2010/main" xmlns="">
                 <a:solidFill>
                   <a:srgbClr val="FFFFFF"/>
                 </a:solidFill>
               </a14:hiddenFill>
             </a:ext>
             <a:ext uri="{91240B29-F687-4f45-9708-019B960494DF}">
-              <a14:hiddenLine xmlns="" xmlns:a14="http://schemas.microsoft.com/office/drawing/2010/main" w="9525">
+              <a14:hiddenLine xmlns:a14="http://schemas.microsoft.com/office/drawing/2010/main" xmlns="" w="9525">
                 <a:solidFill>
                   <a:srgbClr val="000000"/>
                 </a:solidFill>
@@ -1720,14 +1720,14 @@
           </a:ln>
           <a:extLst>
             <a:ext uri="{909E8E84-426E-40dd-AFC4-6F175D3DCCD1}">
-              <a14:hiddenFill xmlns="" xmlns:a14="http://schemas.microsoft.com/office/drawing/2010/main">
+              <a14:hiddenFill xmlns:a14="http://schemas.microsoft.com/office/drawing/2010/main" xmlns="">
                 <a:solidFill>
                   <a:srgbClr val="FFFFFF"/>
                 </a:solidFill>
               </a14:hiddenFill>
             </a:ext>
             <a:ext uri="{91240B29-F687-4f45-9708-019B960494DF}">
-              <a14:hiddenLine xmlns="" xmlns:a14="http://schemas.microsoft.com/office/drawing/2010/main" w="9525">
+              <a14:hiddenLine xmlns:a14="http://schemas.microsoft.com/office/drawing/2010/main" xmlns="" w="9525">
                 <a:solidFill>
                   <a:srgbClr val="000000"/>
                 </a:solidFill>
@@ -1860,14 +1860,14 @@
           </a:ln>
           <a:extLst>
             <a:ext uri="{909E8E84-426E-40dd-AFC4-6F175D3DCCD1}">
-              <a14:hiddenFill xmlns="" xmlns:a14="http://schemas.microsoft.com/office/drawing/2010/main">
+              <a14:hiddenFill xmlns:a14="http://schemas.microsoft.com/office/drawing/2010/main" xmlns="">
                 <a:solidFill>
                   <a:srgbClr val="FFFFFF"/>
                 </a:solidFill>
               </a14:hiddenFill>
             </a:ext>
             <a:ext uri="{91240B29-F687-4f45-9708-019B960494DF}">
-              <a14:hiddenLine xmlns="" xmlns:a14="http://schemas.microsoft.com/office/drawing/2010/main" w="9525">
+              <a14:hiddenLine xmlns:a14="http://schemas.microsoft.com/office/drawing/2010/main" xmlns="" w="9525">
                 <a:solidFill>
                   <a:srgbClr val="000000"/>
                 </a:solidFill>
@@ -1944,14 +1944,14 @@
           </a:ln>
           <a:extLst>
             <a:ext uri="{909E8E84-426E-40dd-AFC4-6F175D3DCCD1}">
-              <a14:hiddenFill xmlns="" xmlns:a14="http://schemas.microsoft.com/office/drawing/2010/main">
+              <a14:hiddenFill xmlns:a14="http://schemas.microsoft.com/office/drawing/2010/main" xmlns="">
                 <a:solidFill>
                   <a:srgbClr val="FFFFFF"/>
                 </a:solidFill>
               </a14:hiddenFill>
             </a:ext>
             <a:ext uri="{91240B29-F687-4f45-9708-019B960494DF}">
-              <a14:hiddenLine xmlns="" xmlns:a14="http://schemas.microsoft.com/office/drawing/2010/main" w="9525">
+              <a14:hiddenLine xmlns:a14="http://schemas.microsoft.com/office/drawing/2010/main" xmlns="" w="9525">
                 <a:solidFill>
                   <a:srgbClr val="000000"/>
                 </a:solidFill>
@@ -2124,14 +2124,14 @@
           </a:ln>
           <a:extLst>
             <a:ext uri="{909E8E84-426E-40dd-AFC4-6F175D3DCCD1}">
-              <a14:hiddenFill xmlns="" xmlns:a14="http://schemas.microsoft.com/office/drawing/2010/main">
+              <a14:hiddenFill xmlns:a14="http://schemas.microsoft.com/office/drawing/2010/main" xmlns="">
                 <a:solidFill>
                   <a:srgbClr val="FFFFFF"/>
                 </a:solidFill>
               </a14:hiddenFill>
             </a:ext>
             <a:ext uri="{91240B29-F687-4f45-9708-019B960494DF}">
-              <a14:hiddenLine xmlns="" xmlns:a14="http://schemas.microsoft.com/office/drawing/2010/main" w="9525">
+              <a14:hiddenLine xmlns:a14="http://schemas.microsoft.com/office/drawing/2010/main" xmlns="" w="9525">
                 <a:solidFill>
                   <a:srgbClr val="000000"/>
                 </a:solidFill>
@@ -2208,14 +2208,14 @@
           </a:ln>
           <a:extLst>
             <a:ext uri="{909E8E84-426E-40dd-AFC4-6F175D3DCCD1}">
-              <a14:hiddenFill xmlns="" xmlns:a14="http://schemas.microsoft.com/office/drawing/2010/main">
+              <a14:hiddenFill xmlns:a14="http://schemas.microsoft.com/office/drawing/2010/main" xmlns="">
                 <a:solidFill>
                   <a:srgbClr val="FFFFFF"/>
                 </a:solidFill>
               </a14:hiddenFill>
             </a:ext>
             <a:ext uri="{91240B29-F687-4f45-9708-019B960494DF}">
-              <a14:hiddenLine xmlns="" xmlns:a14="http://schemas.microsoft.com/office/drawing/2010/main" w="9525">
+              <a14:hiddenLine xmlns:a14="http://schemas.microsoft.com/office/drawing/2010/main" xmlns="" w="9525">
                 <a:solidFill>
                   <a:srgbClr val="000000"/>
                 </a:solidFill>
@@ -2292,14 +2292,14 @@
           </a:ln>
           <a:extLst>
             <a:ext uri="{909E8E84-426E-40dd-AFC4-6F175D3DCCD1}">
-              <a14:hiddenFill xmlns="" xmlns:a14="http://schemas.microsoft.com/office/drawing/2010/main">
+              <a14:hiddenFill xmlns:a14="http://schemas.microsoft.com/office/drawing/2010/main" xmlns="">
                 <a:solidFill>
                   <a:srgbClr val="FFFFFF"/>
                 </a:solidFill>
               </a14:hiddenFill>
             </a:ext>
             <a:ext uri="{91240B29-F687-4f45-9708-019B960494DF}">
-              <a14:hiddenLine xmlns="" xmlns:a14="http://schemas.microsoft.com/office/drawing/2010/main" w="9525">
+              <a14:hiddenLine xmlns:a14="http://schemas.microsoft.com/office/drawing/2010/main" xmlns="" w="9525">
                 <a:solidFill>
                   <a:srgbClr val="000000"/>
                 </a:solidFill>
@@ -2376,14 +2376,14 @@
           </a:ln>
           <a:extLst>
             <a:ext uri="{909E8E84-426E-40dd-AFC4-6F175D3DCCD1}">
-              <a14:hiddenFill xmlns="" xmlns:a14="http://schemas.microsoft.com/office/drawing/2010/main">
+              <a14:hiddenFill xmlns:a14="http://schemas.microsoft.com/office/drawing/2010/main" xmlns="">
                 <a:solidFill>
                   <a:srgbClr val="FFFFFF"/>
                 </a:solidFill>
               </a14:hiddenFill>
             </a:ext>
             <a:ext uri="{91240B29-F687-4f45-9708-019B960494DF}">
-              <a14:hiddenLine xmlns="" xmlns:a14="http://schemas.microsoft.com/office/drawing/2010/main" w="9525">
+              <a14:hiddenLine xmlns:a14="http://schemas.microsoft.com/office/drawing/2010/main" xmlns="" w="9525">
                 <a:solidFill>
                   <a:srgbClr val="000000"/>
                 </a:solidFill>
@@ -2460,14 +2460,14 @@
           </a:ln>
           <a:extLst>
             <a:ext uri="{909E8E84-426E-40dd-AFC4-6F175D3DCCD1}">
-              <a14:hiddenFill xmlns="" xmlns:a14="http://schemas.microsoft.com/office/drawing/2010/main">
+              <a14:hiddenFill xmlns:a14="http://schemas.microsoft.com/office/drawing/2010/main" xmlns="">
                 <a:solidFill>
                   <a:srgbClr val="FFFFFF"/>
                 </a:solidFill>
               </a14:hiddenFill>
             </a:ext>
             <a:ext uri="{91240B29-F687-4f45-9708-019B960494DF}">
-              <a14:hiddenLine xmlns="" xmlns:a14="http://schemas.microsoft.com/office/drawing/2010/main" w="9525">
+              <a14:hiddenLine xmlns:a14="http://schemas.microsoft.com/office/drawing/2010/main" xmlns="" w="9525">
                 <a:solidFill>
                   <a:srgbClr val="000000"/>
                 </a:solidFill>
@@ -2544,14 +2544,14 @@
           </a:ln>
           <a:extLst>
             <a:ext uri="{909E8E84-426E-40dd-AFC4-6F175D3DCCD1}">
-              <a14:hiddenFill xmlns="" xmlns:a14="http://schemas.microsoft.com/office/drawing/2010/main">
+              <a14:hiddenFill xmlns:a14="http://schemas.microsoft.com/office/drawing/2010/main" xmlns="">
                 <a:solidFill>
                   <a:srgbClr val="FFFFFF"/>
                 </a:solidFill>
               </a14:hiddenFill>
             </a:ext>
             <a:ext uri="{91240B29-F687-4f45-9708-019B960494DF}">
-              <a14:hiddenLine xmlns="" xmlns:a14="http://schemas.microsoft.com/office/drawing/2010/main" w="9525">
+              <a14:hiddenLine xmlns:a14="http://schemas.microsoft.com/office/drawing/2010/main" xmlns="" w="9525">
                 <a:solidFill>
                   <a:srgbClr val="000000"/>
                 </a:solidFill>
@@ -2598,14 +2598,14 @@
           </a:ln>
           <a:extLst>
             <a:ext uri="{909E8E84-426E-40dd-AFC4-6F175D3DCCD1}">
-              <a14:hiddenFill xmlns="" xmlns:a14="http://schemas.microsoft.com/office/drawing/2010/main">
+              <a14:hiddenFill xmlns:a14="http://schemas.microsoft.com/office/drawing/2010/main" xmlns="">
                 <a:solidFill>
                   <a:srgbClr val="FFFFFF"/>
                 </a:solidFill>
               </a14:hiddenFill>
             </a:ext>
             <a:ext uri="{91240B29-F687-4f45-9708-019B960494DF}">
-              <a14:hiddenLine xmlns="" xmlns:a14="http://schemas.microsoft.com/office/drawing/2010/main" w="9525">
+              <a14:hiddenLine xmlns:a14="http://schemas.microsoft.com/office/drawing/2010/main" xmlns="" w="9525">
                 <a:solidFill>
                   <a:srgbClr val="000000"/>
                 </a:solidFill>
@@ -2698,14 +2698,14 @@
             </a:ln>
             <a:extLst>
               <a:ext uri="{909E8E84-426E-40dd-AFC4-6F175D3DCCD1}">
-                <a14:hiddenFill xmlns="" xmlns:a14="http://schemas.microsoft.com/office/drawing/2010/main">
+                <a14:hiddenFill xmlns:a14="http://schemas.microsoft.com/office/drawing/2010/main" xmlns="">
                   <a:solidFill>
                     <a:srgbClr val="FFFFFF"/>
                   </a:solidFill>
                 </a14:hiddenFill>
               </a:ext>
               <a:ext uri="{91240B29-F687-4f45-9708-019B960494DF}">
-                <a14:hiddenLine xmlns="" xmlns:a14="http://schemas.microsoft.com/office/drawing/2010/main" w="9525">
+                <a14:hiddenLine xmlns:a14="http://schemas.microsoft.com/office/drawing/2010/main" xmlns="" w="9525">
                   <a:solidFill>
                     <a:srgbClr val="000000"/>
                   </a:solidFill>
@@ -2809,14 +2809,14 @@
           </a:ln>
           <a:extLst>
             <a:ext uri="{909E8E84-426E-40dd-AFC4-6F175D3DCCD1}">
-              <a14:hiddenFill xmlns="" xmlns:a14="http://schemas.microsoft.com/office/drawing/2010/main">
+              <a14:hiddenFill xmlns:a14="http://schemas.microsoft.com/office/drawing/2010/main" xmlns="">
                 <a:solidFill>
                   <a:srgbClr val="FFFFFF"/>
                 </a:solidFill>
               </a14:hiddenFill>
             </a:ext>
             <a:ext uri="{91240B29-F687-4f45-9708-019B960494DF}">
-              <a14:hiddenLine xmlns="" xmlns:a14="http://schemas.microsoft.com/office/drawing/2010/main" w="9525">
+              <a14:hiddenLine xmlns:a14="http://schemas.microsoft.com/office/drawing/2010/main" xmlns="" w="9525">
                 <a:solidFill>
                   <a:srgbClr val="000000"/>
                 </a:solidFill>
@@ -2998,14 +2998,14 @@
           </a:ln>
           <a:extLst>
             <a:ext uri="{909E8E84-426E-40dd-AFC4-6F175D3DCCD1}">
-              <a14:hiddenFill xmlns="" xmlns:a14="http://schemas.microsoft.com/office/drawing/2010/main">
+              <a14:hiddenFill xmlns:a14="http://schemas.microsoft.com/office/drawing/2010/main" xmlns="">
                 <a:solidFill>
                   <a:srgbClr val="FFFFFF"/>
                 </a:solidFill>
               </a14:hiddenFill>
             </a:ext>
             <a:ext uri="{91240B29-F687-4f45-9708-019B960494DF}">
-              <a14:hiddenLine xmlns="" xmlns:a14="http://schemas.microsoft.com/office/drawing/2010/main" w="9525">
+              <a14:hiddenLine xmlns:a14="http://schemas.microsoft.com/office/drawing/2010/main" xmlns="" w="9525">
                 <a:solidFill>
                   <a:srgbClr val="000000"/>
                 </a:solidFill>
@@ -3098,14 +3098,14 @@
             </a:ln>
             <a:extLst>
               <a:ext uri="{909E8E84-426E-40dd-AFC4-6F175D3DCCD1}">
-                <a14:hiddenFill xmlns="" xmlns:a14="http://schemas.microsoft.com/office/drawing/2010/main">
+                <a14:hiddenFill xmlns:a14="http://schemas.microsoft.com/office/drawing/2010/main" xmlns="">
                   <a:solidFill>
                     <a:srgbClr val="FFFFFF"/>
                   </a:solidFill>
                 </a14:hiddenFill>
               </a:ext>
               <a:ext uri="{91240B29-F687-4f45-9708-019B960494DF}">
-                <a14:hiddenLine xmlns="" xmlns:a14="http://schemas.microsoft.com/office/drawing/2010/main" w="9525">
+                <a14:hiddenLine xmlns:a14="http://schemas.microsoft.com/office/drawing/2010/main" xmlns="" w="9525">
                   <a:solidFill>
                     <a:srgbClr val="000000"/>
                   </a:solidFill>
@@ -3209,14 +3209,14 @@
           </a:ln>
           <a:extLst>
             <a:ext uri="{909E8E84-426E-40dd-AFC4-6F175D3DCCD1}">
-              <a14:hiddenFill xmlns="" xmlns:a14="http://schemas.microsoft.com/office/drawing/2010/main">
+              <a14:hiddenFill xmlns:a14="http://schemas.microsoft.com/office/drawing/2010/main" xmlns="">
                 <a:solidFill>
                   <a:srgbClr val="FFFFFF"/>
                 </a:solidFill>
               </a14:hiddenFill>
             </a:ext>
             <a:ext uri="{91240B29-F687-4f45-9708-019B960494DF}">
-              <a14:hiddenLine xmlns="" xmlns:a14="http://schemas.microsoft.com/office/drawing/2010/main" w="9525">
+              <a14:hiddenLine xmlns:a14="http://schemas.microsoft.com/office/drawing/2010/main" xmlns="" w="9525">
                 <a:solidFill>
                   <a:srgbClr val="000000"/>
                 </a:solidFill>
@@ -3465,14 +3465,14 @@
           </a:ln>
           <a:extLst>
             <a:ext uri="{909E8E84-426E-40dd-AFC4-6F175D3DCCD1}">
-              <a14:hiddenFill xmlns="" xmlns:a14="http://schemas.microsoft.com/office/drawing/2010/main">
+              <a14:hiddenFill xmlns:a14="http://schemas.microsoft.com/office/drawing/2010/main" xmlns="">
                 <a:solidFill>
                   <a:srgbClr val="FFFFFF"/>
                 </a:solidFill>
               </a14:hiddenFill>
             </a:ext>
             <a:ext uri="{91240B29-F687-4f45-9708-019B960494DF}">
-              <a14:hiddenLine xmlns="" xmlns:a14="http://schemas.microsoft.com/office/drawing/2010/main" w="9525">
+              <a14:hiddenLine xmlns:a14="http://schemas.microsoft.com/office/drawing/2010/main" xmlns="" w="9525">
                 <a:solidFill>
                   <a:srgbClr val="000000"/>
                 </a:solidFill>
@@ -3718,14 +3718,14 @@
             </a:ln>
             <a:extLst>
               <a:ext uri="{909E8E84-426E-40dd-AFC4-6F175D3DCCD1}">
-                <a14:hiddenFill xmlns="" xmlns:a14="http://schemas.microsoft.com/office/drawing/2010/main">
+                <a14:hiddenFill xmlns:a14="http://schemas.microsoft.com/office/drawing/2010/main" xmlns="">
                   <a:solidFill>
                     <a:srgbClr val="FFFFFF"/>
                   </a:solidFill>
                 </a14:hiddenFill>
               </a:ext>
               <a:ext uri="{91240B29-F687-4f45-9708-019B960494DF}">
-                <a14:hiddenLine xmlns="" xmlns:a14="http://schemas.microsoft.com/office/drawing/2010/main" w="9525">
+                <a14:hiddenLine xmlns:a14="http://schemas.microsoft.com/office/drawing/2010/main" xmlns="" w="9525">
                   <a:solidFill>
                     <a:srgbClr val="000000"/>
                   </a:solidFill>
@@ -3829,14 +3829,14 @@
           </a:ln>
           <a:extLst>
             <a:ext uri="{909E8E84-426E-40dd-AFC4-6F175D3DCCD1}">
-              <a14:hiddenFill xmlns="" xmlns:a14="http://schemas.microsoft.com/office/drawing/2010/main">
+              <a14:hiddenFill xmlns:a14="http://schemas.microsoft.com/office/drawing/2010/main" xmlns="">
                 <a:solidFill>
                   <a:srgbClr val="FFFFFF"/>
                 </a:solidFill>
               </a14:hiddenFill>
             </a:ext>
             <a:ext uri="{91240B29-F687-4f45-9708-019B960494DF}">
-              <a14:hiddenLine xmlns="" xmlns:a14="http://schemas.microsoft.com/office/drawing/2010/main" w="9525">
+              <a14:hiddenLine xmlns:a14="http://schemas.microsoft.com/office/drawing/2010/main" xmlns="" w="9525">
                 <a:solidFill>
                   <a:srgbClr val="000000"/>
                 </a:solidFill>
@@ -4023,14 +4023,14 @@
           </a:ln>
           <a:extLst>
             <a:ext uri="{909E8E84-426E-40dd-AFC4-6F175D3DCCD1}">
-              <a14:hiddenFill xmlns="" xmlns:a14="http://schemas.microsoft.com/office/drawing/2010/main">
+              <a14:hiddenFill xmlns:a14="http://schemas.microsoft.com/office/drawing/2010/main" xmlns="">
                 <a:solidFill>
                   <a:srgbClr val="FFFFFF"/>
                 </a:solidFill>
               </a14:hiddenFill>
             </a:ext>
             <a:ext uri="{91240B29-F687-4f45-9708-019B960494DF}">
-              <a14:hiddenLine xmlns="" xmlns:a14="http://schemas.microsoft.com/office/drawing/2010/main" w="9525">
+              <a14:hiddenLine xmlns:a14="http://schemas.microsoft.com/office/drawing/2010/main" xmlns="" w="9525">
                 <a:solidFill>
                   <a:srgbClr val="000000"/>
                 </a:solidFill>
@@ -4204,14 +4204,14 @@
             </a:ln>
             <a:extLst>
               <a:ext uri="{909E8E84-426E-40dd-AFC4-6F175D3DCCD1}">
-                <a14:hiddenFill xmlns="" xmlns:a14="http://schemas.microsoft.com/office/drawing/2010/main">
+                <a14:hiddenFill xmlns:a14="http://schemas.microsoft.com/office/drawing/2010/main" xmlns="">
                   <a:solidFill>
                     <a:srgbClr val="FFFFFF"/>
                   </a:solidFill>
                 </a14:hiddenFill>
               </a:ext>
               <a:ext uri="{91240B29-F687-4f45-9708-019B960494DF}">
-                <a14:hiddenLine xmlns="" xmlns:a14="http://schemas.microsoft.com/office/drawing/2010/main" w="9525">
+                <a14:hiddenLine xmlns:a14="http://schemas.microsoft.com/office/drawing/2010/main" xmlns="" w="9525">
                   <a:solidFill>
                     <a:srgbClr val="000000"/>
                   </a:solidFill>
@@ -4315,14 +4315,14 @@
           </a:ln>
           <a:extLst>
             <a:ext uri="{909E8E84-426E-40dd-AFC4-6F175D3DCCD1}">
-              <a14:hiddenFill xmlns="" xmlns:a14="http://schemas.microsoft.com/office/drawing/2010/main">
+              <a14:hiddenFill xmlns:a14="http://schemas.microsoft.com/office/drawing/2010/main" xmlns="">
                 <a:solidFill>
                   <a:srgbClr val="FFFFFF"/>
                 </a:solidFill>
               </a14:hiddenFill>
             </a:ext>
             <a:ext uri="{91240B29-F687-4f45-9708-019B960494DF}">
-              <a14:hiddenLine xmlns="" xmlns:a14="http://schemas.microsoft.com/office/drawing/2010/main" w="9525">
+              <a14:hiddenLine xmlns:a14="http://schemas.microsoft.com/office/drawing/2010/main" xmlns="" w="9525">
                 <a:solidFill>
                   <a:srgbClr val="000000"/>
                 </a:solidFill>
@@ -4480,14 +4480,14 @@
           </a:ln>
           <a:extLst>
             <a:ext uri="{909E8E84-426E-40dd-AFC4-6F175D3DCCD1}">
-              <a14:hiddenFill xmlns="" xmlns:a14="http://schemas.microsoft.com/office/drawing/2010/main">
+              <a14:hiddenFill xmlns:a14="http://schemas.microsoft.com/office/drawing/2010/main" xmlns="">
                 <a:solidFill>
                   <a:srgbClr val="FFFFFF"/>
                 </a:solidFill>
               </a14:hiddenFill>
             </a:ext>
             <a:ext uri="{91240B29-F687-4f45-9708-019B960494DF}">
-              <a14:hiddenLine xmlns="" xmlns:a14="http://schemas.microsoft.com/office/drawing/2010/main" w="9525">
+              <a14:hiddenLine xmlns:a14="http://schemas.microsoft.com/office/drawing/2010/main" xmlns="" w="9525">
                 <a:solidFill>
                   <a:srgbClr val="000000"/>
                 </a:solidFill>
@@ -4868,14 +4868,14 @@
           </a:ln>
           <a:extLst>
             <a:ext uri="{909E8E84-426E-40dd-AFC4-6F175D3DCCD1}">
-              <a14:hiddenFill xmlns="" xmlns:a14="http://schemas.microsoft.com/office/drawing/2010/main">
+              <a14:hiddenFill xmlns:a14="http://schemas.microsoft.com/office/drawing/2010/main" xmlns="">
                 <a:solidFill>
                   <a:srgbClr val="FFFFFF"/>
                 </a:solidFill>
               </a14:hiddenFill>
             </a:ext>
             <a:ext uri="{91240B29-F687-4f45-9708-019B960494DF}">
-              <a14:hiddenLine xmlns="" xmlns:a14="http://schemas.microsoft.com/office/drawing/2010/main" w="9525">
+              <a14:hiddenLine xmlns:a14="http://schemas.microsoft.com/office/drawing/2010/main" xmlns="" w="9525">
                 <a:solidFill>
                   <a:srgbClr val="000000"/>
                 </a:solidFill>
@@ -4922,14 +4922,14 @@
           </a:ln>
           <a:extLst>
             <a:ext uri="{909E8E84-426E-40dd-AFC4-6F175D3DCCD1}">
-              <a14:hiddenFill xmlns="" xmlns:a14="http://schemas.microsoft.com/office/drawing/2010/main">
+              <a14:hiddenFill xmlns:a14="http://schemas.microsoft.com/office/drawing/2010/main" xmlns="">
                 <a:solidFill>
                   <a:srgbClr val="FFFFFF"/>
                 </a:solidFill>
               </a14:hiddenFill>
             </a:ext>
             <a:ext uri="{91240B29-F687-4f45-9708-019B960494DF}">
-              <a14:hiddenLine xmlns="" xmlns:a14="http://schemas.microsoft.com/office/drawing/2010/main" w="9525">
+              <a14:hiddenLine xmlns:a14="http://schemas.microsoft.com/office/drawing/2010/main" xmlns="" w="9525">
                 <a:solidFill>
                   <a:srgbClr val="000000"/>
                 </a:solidFill>
@@ -5378,14 +5378,14 @@
             </a:ln>
             <a:extLst>
               <a:ext uri="{909E8E84-426E-40dd-AFC4-6F175D3DCCD1}">
-                <a14:hiddenFill xmlns="" xmlns:a14="http://schemas.microsoft.com/office/drawing/2010/main">
+                <a14:hiddenFill xmlns:a14="http://schemas.microsoft.com/office/drawing/2010/main" xmlns="">
                   <a:solidFill>
                     <a:srgbClr val="FFFFFF"/>
                   </a:solidFill>
                 </a14:hiddenFill>
               </a:ext>
               <a:ext uri="{91240B29-F687-4f45-9708-019B960494DF}">
-                <a14:hiddenLine xmlns="" xmlns:a14="http://schemas.microsoft.com/office/drawing/2010/main" w="9525">
+                <a14:hiddenLine xmlns:a14="http://schemas.microsoft.com/office/drawing/2010/main" xmlns="" w="9525">
                   <a:solidFill>
                     <a:srgbClr val="000000"/>
                   </a:solidFill>
@@ -5489,14 +5489,14 @@
           </a:ln>
           <a:extLst>
             <a:ext uri="{909E8E84-426E-40dd-AFC4-6F175D3DCCD1}">
-              <a14:hiddenFill xmlns="" xmlns:a14="http://schemas.microsoft.com/office/drawing/2010/main">
+              <a14:hiddenFill xmlns:a14="http://schemas.microsoft.com/office/drawing/2010/main" xmlns="">
                 <a:solidFill>
                   <a:srgbClr val="FFFFFF"/>
                 </a:solidFill>
               </a14:hiddenFill>
             </a:ext>
             <a:ext uri="{91240B29-F687-4f45-9708-019B960494DF}">
-              <a14:hiddenLine xmlns="" xmlns:a14="http://schemas.microsoft.com/office/drawing/2010/main" w="9525">
+              <a14:hiddenLine xmlns:a14="http://schemas.microsoft.com/office/drawing/2010/main" xmlns="" w="9525">
                 <a:solidFill>
                   <a:srgbClr val="000000"/>
                 </a:solidFill>
@@ -5830,14 +5830,14 @@
           </a:ln>
           <a:extLst>
             <a:ext uri="{909E8E84-426E-40dd-AFC4-6F175D3DCCD1}">
-              <a14:hiddenFill xmlns="" xmlns:a14="http://schemas.microsoft.com/office/drawing/2010/main">
+              <a14:hiddenFill xmlns:a14="http://schemas.microsoft.com/office/drawing/2010/main" xmlns="">
                 <a:solidFill>
                   <a:srgbClr val="FFFFFF"/>
                 </a:solidFill>
               </a14:hiddenFill>
             </a:ext>
             <a:ext uri="{91240B29-F687-4f45-9708-019B960494DF}">
-              <a14:hiddenLine xmlns="" xmlns:a14="http://schemas.microsoft.com/office/drawing/2010/main" w="9525">
+              <a14:hiddenLine xmlns:a14="http://schemas.microsoft.com/office/drawing/2010/main" xmlns="" w="9525">
                 <a:solidFill>
                   <a:srgbClr val="000000"/>
                 </a:solidFill>
@@ -5884,14 +5884,14 @@
           </a:ln>
           <a:extLst>
             <a:ext uri="{909E8E84-426E-40dd-AFC4-6F175D3DCCD1}">
-              <a14:hiddenFill xmlns="" xmlns:a14="http://schemas.microsoft.com/office/drawing/2010/main">
+              <a14:hiddenFill xmlns:a14="http://schemas.microsoft.com/office/drawing/2010/main" xmlns="">
                 <a:solidFill>
                   <a:srgbClr val="FFFFFF"/>
                 </a:solidFill>
               </a14:hiddenFill>
             </a:ext>
             <a:ext uri="{91240B29-F687-4f45-9708-019B960494DF}">
-              <a14:hiddenLine xmlns="" xmlns:a14="http://schemas.microsoft.com/office/drawing/2010/main" w="9525">
+              <a14:hiddenLine xmlns:a14="http://schemas.microsoft.com/office/drawing/2010/main" xmlns="" w="9525">
                 <a:solidFill>
                   <a:srgbClr val="000000"/>
                 </a:solidFill>
@@ -6002,7 +6002,7 @@
               <a:pPr>
                 <a:defRPr/>
               </a:pPr>
-              <a:t>22.8.2018</a:t>
+              <a:t>12.9.2018</a:t>
             </a:fld>
             <a:endParaRPr dirty="0"/>
           </a:p>
@@ -6073,14 +6073,14 @@
           </a:ln>
           <a:extLst>
             <a:ext uri="{909E8E84-426E-40dd-AFC4-6F175D3DCCD1}">
-              <a14:hiddenFill xmlns="" xmlns:a14="http://schemas.microsoft.com/office/drawing/2010/main">
+              <a14:hiddenFill xmlns:a14="http://schemas.microsoft.com/office/drawing/2010/main" xmlns="">
                 <a:solidFill>
                   <a:srgbClr val="FFFFFF"/>
                 </a:solidFill>
               </a14:hiddenFill>
             </a:ext>
             <a:ext uri="{91240B29-F687-4f45-9708-019B960494DF}">
-              <a14:hiddenLine xmlns="" xmlns:a14="http://schemas.microsoft.com/office/drawing/2010/main" w="9525">
+              <a14:hiddenLine xmlns:a14="http://schemas.microsoft.com/office/drawing/2010/main" xmlns="" w="9525">
                 <a:solidFill>
                   <a:srgbClr val="000000"/>
                 </a:solidFill>
@@ -6628,14 +6628,14 @@
             </a:ln>
             <a:extLst>
               <a:ext uri="{909E8E84-426E-40dd-AFC4-6F175D3DCCD1}">
-                <a14:hiddenFill xmlns="" xmlns:a14="http://schemas.microsoft.com/office/drawing/2010/main">
+                <a14:hiddenFill xmlns:a14="http://schemas.microsoft.com/office/drawing/2010/main" xmlns="">
                   <a:solidFill>
                     <a:srgbClr val="FFFFFF"/>
                   </a:solidFill>
                 </a14:hiddenFill>
               </a:ext>
               <a:ext uri="{91240B29-F687-4f45-9708-019B960494DF}">
-                <a14:hiddenLine xmlns="" xmlns:a14="http://schemas.microsoft.com/office/drawing/2010/main" w="9525">
+                <a14:hiddenLine xmlns:a14="http://schemas.microsoft.com/office/drawing/2010/main" xmlns="" w="9525">
                   <a:solidFill>
                     <a:srgbClr val="000000"/>
                   </a:solidFill>
@@ -6739,14 +6739,14 @@
           </a:ln>
           <a:extLst>
             <a:ext uri="{909E8E84-426E-40dd-AFC4-6F175D3DCCD1}">
-              <a14:hiddenFill xmlns="" xmlns:a14="http://schemas.microsoft.com/office/drawing/2010/main">
+              <a14:hiddenFill xmlns:a14="http://schemas.microsoft.com/office/drawing/2010/main" xmlns="">
                 <a:solidFill>
                   <a:srgbClr val="FFFFFF"/>
                 </a:solidFill>
               </a14:hiddenFill>
             </a:ext>
             <a:ext uri="{91240B29-F687-4f45-9708-019B960494DF}">
-              <a14:hiddenLine xmlns="" xmlns:a14="http://schemas.microsoft.com/office/drawing/2010/main" w="9525">
+              <a14:hiddenLine xmlns:a14="http://schemas.microsoft.com/office/drawing/2010/main" xmlns="" w="9525">
                 <a:solidFill>
                   <a:srgbClr val="000000"/>
                 </a:solidFill>
@@ -7148,14 +7148,14 @@
           </a:ln>
           <a:extLst>
             <a:ext uri="{909E8E84-426E-40dd-AFC4-6F175D3DCCD1}">
-              <a14:hiddenFill xmlns="" xmlns:a14="http://schemas.microsoft.com/office/drawing/2010/main">
+              <a14:hiddenFill xmlns:a14="http://schemas.microsoft.com/office/drawing/2010/main" xmlns="">
                 <a:solidFill>
                   <a:srgbClr val="FFFFFF"/>
                 </a:solidFill>
               </a14:hiddenFill>
             </a:ext>
             <a:ext uri="{91240B29-F687-4f45-9708-019B960494DF}">
-              <a14:hiddenLine xmlns="" xmlns:a14="http://schemas.microsoft.com/office/drawing/2010/main" w="9525">
+              <a14:hiddenLine xmlns:a14="http://schemas.microsoft.com/office/drawing/2010/main" xmlns="" w="9525">
                 <a:solidFill>
                   <a:srgbClr val="000000"/>
                 </a:solidFill>
@@ -7630,14 +7630,14 @@
           </a:ln>
           <a:extLst>
             <a:ext uri="{909E8E84-426E-40dd-AFC4-6F175D3DCCD1}">
-              <a14:hiddenFill xmlns="" xmlns:a14="http://schemas.microsoft.com/office/drawing/2010/main">
+              <a14:hiddenFill xmlns:a14="http://schemas.microsoft.com/office/drawing/2010/main" xmlns="">
                 <a:solidFill>
                   <a:srgbClr val="FFFFFF"/>
                 </a:solidFill>
               </a14:hiddenFill>
             </a:ext>
             <a:ext uri="{91240B29-F687-4f45-9708-019B960494DF}">
-              <a14:hiddenLine xmlns="" xmlns:a14="http://schemas.microsoft.com/office/drawing/2010/main" w="9525">
+              <a14:hiddenLine xmlns:a14="http://schemas.microsoft.com/office/drawing/2010/main" xmlns="" w="9525">
                 <a:solidFill>
                   <a:srgbClr val="000000"/>
                 </a:solidFill>
@@ -8138,14 +8138,14 @@
           </a:ln>
           <a:extLst>
             <a:ext uri="{909E8E84-426E-40dd-AFC4-6F175D3DCCD1}">
-              <a14:hiddenFill xmlns="" xmlns:a14="http://schemas.microsoft.com/office/drawing/2010/main">
+              <a14:hiddenFill xmlns:a14="http://schemas.microsoft.com/office/drawing/2010/main" xmlns="">
                 <a:solidFill>
                   <a:srgbClr val="FFFFFF"/>
                 </a:solidFill>
               </a14:hiddenFill>
             </a:ext>
             <a:ext uri="{91240B29-F687-4f45-9708-019B960494DF}">
-              <a14:hiddenLine xmlns="" xmlns:a14="http://schemas.microsoft.com/office/drawing/2010/main" w="9525">
+              <a14:hiddenLine xmlns:a14="http://schemas.microsoft.com/office/drawing/2010/main" xmlns="" w="9525">
                 <a:solidFill>
                   <a:srgbClr val="000000"/>
                 </a:solidFill>
@@ -8769,14 +8769,14 @@
           </a:ln>
           <a:extLst>
             <a:ext uri="{909E8E84-426E-40dd-AFC4-6F175D3DCCD1}">
-              <a14:hiddenFill xmlns="" xmlns:a14="http://schemas.microsoft.com/office/drawing/2010/main">
+              <a14:hiddenFill xmlns:a14="http://schemas.microsoft.com/office/drawing/2010/main" xmlns="">
                 <a:solidFill>
                   <a:srgbClr val="FFFFFF"/>
                 </a:solidFill>
               </a14:hiddenFill>
             </a:ext>
             <a:ext uri="{91240B29-F687-4f45-9708-019B960494DF}">
-              <a14:hiddenLine xmlns="" xmlns:a14="http://schemas.microsoft.com/office/drawing/2010/main" w="9525">
+              <a14:hiddenLine xmlns:a14="http://schemas.microsoft.com/office/drawing/2010/main" xmlns="" w="9525">
                 <a:solidFill>
                   <a:srgbClr val="000000"/>
                 </a:solidFill>
@@ -9271,14 +9271,14 @@
           </a:ln>
           <a:extLst>
             <a:ext uri="{909E8E84-426E-40dd-AFC4-6F175D3DCCD1}">
-              <a14:hiddenFill xmlns="" xmlns:a14="http://schemas.microsoft.com/office/drawing/2010/main">
+              <a14:hiddenFill xmlns:a14="http://schemas.microsoft.com/office/drawing/2010/main" xmlns="">
                 <a:solidFill>
                   <a:srgbClr val="FFFFFF"/>
                 </a:solidFill>
               </a14:hiddenFill>
             </a:ext>
             <a:ext uri="{91240B29-F687-4f45-9708-019B960494DF}">
-              <a14:hiddenLine xmlns="" xmlns:a14="http://schemas.microsoft.com/office/drawing/2010/main" w="9525">
+              <a14:hiddenLine xmlns:a14="http://schemas.microsoft.com/office/drawing/2010/main" xmlns="" w="9525">
                 <a:solidFill>
                   <a:srgbClr val="000000"/>
                 </a:solidFill>
@@ -9382,14 +9382,14 @@
           </a:ln>
           <a:extLst>
             <a:ext uri="{909E8E84-426E-40dd-AFC4-6F175D3DCCD1}">
-              <a14:hiddenFill xmlns="" xmlns:a14="http://schemas.microsoft.com/office/drawing/2010/main">
+              <a14:hiddenFill xmlns:a14="http://schemas.microsoft.com/office/drawing/2010/main" xmlns="">
                 <a:solidFill>
                   <a:srgbClr val="FFFFFF"/>
                 </a:solidFill>
               </a14:hiddenFill>
             </a:ext>
             <a:ext uri="{91240B29-F687-4f45-9708-019B960494DF}">
-              <a14:hiddenLine xmlns="" xmlns:a14="http://schemas.microsoft.com/office/drawing/2010/main" w="9525">
+              <a14:hiddenLine xmlns:a14="http://schemas.microsoft.com/office/drawing/2010/main" xmlns="" w="9525">
                 <a:solidFill>
                   <a:srgbClr val="000000"/>
                 </a:solidFill>
@@ -10321,14 +10321,14 @@
           </a:ln>
           <a:extLst>
             <a:ext uri="{909E8E84-426E-40dd-AFC4-6F175D3DCCD1}">
-              <a14:hiddenFill xmlns="" xmlns:a14="http://schemas.microsoft.com/office/drawing/2010/main">
+              <a14:hiddenFill xmlns:a14="http://schemas.microsoft.com/office/drawing/2010/main" xmlns="">
                 <a:solidFill>
                   <a:srgbClr val="FFFFFF"/>
                 </a:solidFill>
               </a14:hiddenFill>
             </a:ext>
             <a:ext uri="{91240B29-F687-4f45-9708-019B960494DF}">
-              <a14:hiddenLine xmlns="" xmlns:a14="http://schemas.microsoft.com/office/drawing/2010/main" w="9525">
+              <a14:hiddenLine xmlns:a14="http://schemas.microsoft.com/office/drawing/2010/main" xmlns="" w="9525">
                 <a:solidFill>
                   <a:srgbClr val="000000"/>
                 </a:solidFill>
@@ -10375,14 +10375,14 @@
           </a:ln>
           <a:extLst>
             <a:ext uri="{909E8E84-426E-40dd-AFC4-6F175D3DCCD1}">
-              <a14:hiddenFill xmlns="" xmlns:a14="http://schemas.microsoft.com/office/drawing/2010/main">
+              <a14:hiddenFill xmlns:a14="http://schemas.microsoft.com/office/drawing/2010/main" xmlns="">
                 <a:solidFill>
                   <a:srgbClr val="FFFFFF"/>
                 </a:solidFill>
               </a14:hiddenFill>
             </a:ext>
             <a:ext uri="{91240B29-F687-4f45-9708-019B960494DF}">
-              <a14:hiddenLine xmlns="" xmlns:a14="http://schemas.microsoft.com/office/drawing/2010/main" w="9525">
+              <a14:hiddenLine xmlns:a14="http://schemas.microsoft.com/office/drawing/2010/main" xmlns="" w="9525">
                 <a:solidFill>
                   <a:srgbClr val="000000"/>
                 </a:solidFill>
@@ -10493,7 +10493,7 @@
               <a:pPr>
                 <a:defRPr/>
               </a:pPr>
-              <a:t>22.8.2018</a:t>
+              <a:t>12.9.2018</a:t>
             </a:fld>
             <a:endParaRPr dirty="0"/>
           </a:p>
@@ -11710,14 +11710,14 @@
           </a:ln>
           <a:extLst>
             <a:ext uri="{909E8E84-426E-40dd-AFC4-6F175D3DCCD1}">
-              <a14:hiddenFill xmlns="" xmlns:a14="http://schemas.microsoft.com/office/drawing/2010/main">
+              <a14:hiddenFill xmlns:a14="http://schemas.microsoft.com/office/drawing/2010/main" xmlns="">
                 <a:solidFill>
                   <a:srgbClr val="FFFFFF"/>
                 </a:solidFill>
               </a14:hiddenFill>
             </a:ext>
             <a:ext uri="{91240B29-F687-4f45-9708-019B960494DF}">
-              <a14:hiddenLine xmlns="" xmlns:a14="http://schemas.microsoft.com/office/drawing/2010/main" w="9525">
+              <a14:hiddenLine xmlns:a14="http://schemas.microsoft.com/office/drawing/2010/main" xmlns="" w="9525">
                 <a:solidFill>
                   <a:srgbClr val="000000"/>
                 </a:solidFill>
@@ -12380,14 +12380,14 @@
           </a:ln>
           <a:extLst>
             <a:ext uri="{909E8E84-426E-40dd-AFC4-6F175D3DCCD1}">
-              <a14:hiddenFill xmlns="" xmlns:a14="http://schemas.microsoft.com/office/drawing/2010/main">
+              <a14:hiddenFill xmlns:a14="http://schemas.microsoft.com/office/drawing/2010/main" xmlns="">
                 <a:solidFill>
                   <a:srgbClr val="FFFFFF"/>
                 </a:solidFill>
               </a14:hiddenFill>
             </a:ext>
             <a:ext uri="{91240B29-F687-4f45-9708-019B960494DF}">
-              <a14:hiddenLine xmlns="" xmlns:a14="http://schemas.microsoft.com/office/drawing/2010/main" w="9525">
+              <a14:hiddenLine xmlns:a14="http://schemas.microsoft.com/office/drawing/2010/main" xmlns="" w="9525">
                 <a:solidFill>
                   <a:srgbClr val="000000"/>
                 </a:solidFill>
@@ -13142,14 +13142,14 @@
           </a:ln>
           <a:extLst>
             <a:ext uri="{909E8E84-426E-40dd-AFC4-6F175D3DCCD1}">
-              <a14:hiddenFill xmlns="" xmlns:a14="http://schemas.microsoft.com/office/drawing/2010/main">
+              <a14:hiddenFill xmlns:a14="http://schemas.microsoft.com/office/drawing/2010/main" xmlns="">
                 <a:solidFill>
                   <a:srgbClr val="FFFFFF"/>
                 </a:solidFill>
               </a14:hiddenFill>
             </a:ext>
             <a:ext uri="{91240B29-F687-4f45-9708-019B960494DF}">
-              <a14:hiddenLine xmlns="" xmlns:a14="http://schemas.microsoft.com/office/drawing/2010/main" w="9525">
+              <a14:hiddenLine xmlns:a14="http://schemas.microsoft.com/office/drawing/2010/main" xmlns="" w="9525">
                 <a:solidFill>
                   <a:srgbClr val="000000"/>
                 </a:solidFill>
@@ -13196,14 +13196,14 @@
           </a:ln>
           <a:extLst>
             <a:ext uri="{909E8E84-426E-40dd-AFC4-6F175D3DCCD1}">
-              <a14:hiddenFill xmlns="" xmlns:a14="http://schemas.microsoft.com/office/drawing/2010/main">
+              <a14:hiddenFill xmlns:a14="http://schemas.microsoft.com/office/drawing/2010/main" xmlns="">
                 <a:solidFill>
                   <a:srgbClr val="FFFFFF"/>
                 </a:solidFill>
               </a14:hiddenFill>
             </a:ext>
             <a:ext uri="{91240B29-F687-4f45-9708-019B960494DF}">
-              <a14:hiddenLine xmlns="" xmlns:a14="http://schemas.microsoft.com/office/drawing/2010/main" w="9525">
+              <a14:hiddenLine xmlns:a14="http://schemas.microsoft.com/office/drawing/2010/main" xmlns="" w="9525">
                 <a:solidFill>
                   <a:srgbClr val="000000"/>
                 </a:solidFill>
@@ -13311,7 +13311,7 @@
               <a:pPr>
                 <a:defRPr/>
               </a:pPr>
-              <a:t>22.8.2018</a:t>
+              <a:t>12.9.2018</a:t>
             </a:fld>
             <a:endParaRPr dirty="0"/>
           </a:p>
@@ -13382,14 +13382,14 @@
           </a:ln>
           <a:extLst>
             <a:ext uri="{909E8E84-426E-40dd-AFC4-6F175D3DCCD1}">
-              <a14:hiddenFill xmlns="" xmlns:a14="http://schemas.microsoft.com/office/drawing/2010/main">
+              <a14:hiddenFill xmlns:a14="http://schemas.microsoft.com/office/drawing/2010/main" xmlns="">
                 <a:solidFill>
                   <a:srgbClr val="FFFFFF"/>
                 </a:solidFill>
               </a14:hiddenFill>
             </a:ext>
             <a:ext uri="{91240B29-F687-4f45-9708-019B960494DF}">
-              <a14:hiddenLine xmlns="" xmlns:a14="http://schemas.microsoft.com/office/drawing/2010/main" w="9525">
+              <a14:hiddenLine xmlns:a14="http://schemas.microsoft.com/office/drawing/2010/main" xmlns="" w="9525">
                 <a:solidFill>
                   <a:srgbClr val="000000"/>
                 </a:solidFill>
@@ -16462,14 +16462,14 @@
             </a:ln>
             <a:extLst>
               <a:ext uri="{909E8E84-426E-40dd-AFC4-6F175D3DCCD1}">
-                <a14:hiddenFill xmlns="" xmlns:a14="http://schemas.microsoft.com/office/drawing/2010/main">
+                <a14:hiddenFill xmlns:a14="http://schemas.microsoft.com/office/drawing/2010/main" xmlns="">
                   <a:solidFill>
                     <a:srgbClr val="FFFFFF"/>
                   </a:solidFill>
                 </a14:hiddenFill>
               </a:ext>
               <a:ext uri="{91240B29-F687-4f45-9708-019B960494DF}">
-                <a14:hiddenLine xmlns="" xmlns:a14="http://schemas.microsoft.com/office/drawing/2010/main" w="9525">
+                <a14:hiddenLine xmlns:a14="http://schemas.microsoft.com/office/drawing/2010/main" xmlns="" w="9525">
                   <a:solidFill>
                     <a:srgbClr val="000000"/>
                   </a:solidFill>
@@ -16573,14 +16573,14 @@
           </a:ln>
           <a:extLst>
             <a:ext uri="{909E8E84-426E-40dd-AFC4-6F175D3DCCD1}">
-              <a14:hiddenFill xmlns="" xmlns:a14="http://schemas.microsoft.com/office/drawing/2010/main">
+              <a14:hiddenFill xmlns:a14="http://schemas.microsoft.com/office/drawing/2010/main" xmlns="">
                 <a:solidFill>
                   <a:srgbClr val="FFFFFF"/>
                 </a:solidFill>
               </a14:hiddenFill>
             </a:ext>
             <a:ext uri="{91240B29-F687-4f45-9708-019B960494DF}">
-              <a14:hiddenLine xmlns="" xmlns:a14="http://schemas.microsoft.com/office/drawing/2010/main" w="9525">
+              <a14:hiddenLine xmlns:a14="http://schemas.microsoft.com/office/drawing/2010/main" xmlns="" w="9525">
                 <a:solidFill>
                   <a:srgbClr val="000000"/>
                 </a:solidFill>
@@ -16657,14 +16657,14 @@
           </a:ln>
           <a:extLst>
             <a:ext uri="{909E8E84-426E-40dd-AFC4-6F175D3DCCD1}">
-              <a14:hiddenFill xmlns="" xmlns:a14="http://schemas.microsoft.com/office/drawing/2010/main">
+              <a14:hiddenFill xmlns:a14="http://schemas.microsoft.com/office/drawing/2010/main" xmlns="">
                 <a:solidFill>
                   <a:srgbClr val="FFFFFF"/>
                 </a:solidFill>
               </a14:hiddenFill>
             </a:ext>
             <a:ext uri="{91240B29-F687-4f45-9708-019B960494DF}">
-              <a14:hiddenLine xmlns="" xmlns:a14="http://schemas.microsoft.com/office/drawing/2010/main" w="9525">
+              <a14:hiddenLine xmlns:a14="http://schemas.microsoft.com/office/drawing/2010/main" xmlns="" w="9525">
                 <a:solidFill>
                   <a:srgbClr val="000000"/>
                 </a:solidFill>
@@ -16712,14 +16712,14 @@
           </a:ln>
           <a:extLst>
             <a:ext uri="{909E8E84-426E-40dd-AFC4-6F175D3DCCD1}">
-              <a14:hiddenFill xmlns="" xmlns:a14="http://schemas.microsoft.com/office/drawing/2010/main">
+              <a14:hiddenFill xmlns:a14="http://schemas.microsoft.com/office/drawing/2010/main" xmlns="">
                 <a:solidFill>
                   <a:srgbClr val="FFFFFF"/>
                 </a:solidFill>
               </a14:hiddenFill>
             </a:ext>
             <a:ext uri="{91240B29-F687-4f45-9708-019B960494DF}">
-              <a14:hiddenLine xmlns="" xmlns:a14="http://schemas.microsoft.com/office/drawing/2010/main" w="9525">
+              <a14:hiddenLine xmlns:a14="http://schemas.microsoft.com/office/drawing/2010/main" xmlns="" w="9525">
                 <a:solidFill>
                   <a:srgbClr val="000000"/>
                 </a:solidFill>
@@ -16852,14 +16852,14 @@
           </a:ln>
           <a:extLst>
             <a:ext uri="{909E8E84-426E-40dd-AFC4-6F175D3DCCD1}">
-              <a14:hiddenFill xmlns="" xmlns:a14="http://schemas.microsoft.com/office/drawing/2010/main">
+              <a14:hiddenFill xmlns:a14="http://schemas.microsoft.com/office/drawing/2010/main" xmlns="">
                 <a:solidFill>
                   <a:srgbClr val="FFFFFF"/>
                 </a:solidFill>
               </a14:hiddenFill>
             </a:ext>
             <a:ext uri="{91240B29-F687-4f45-9708-019B960494DF}">
-              <a14:hiddenLine xmlns="" xmlns:a14="http://schemas.microsoft.com/office/drawing/2010/main" w="9525">
+              <a14:hiddenLine xmlns:a14="http://schemas.microsoft.com/office/drawing/2010/main" xmlns="" w="9525">
                 <a:solidFill>
                   <a:srgbClr val="000000"/>
                 </a:solidFill>
@@ -16936,14 +16936,14 @@
           </a:ln>
           <a:extLst>
             <a:ext uri="{909E8E84-426E-40dd-AFC4-6F175D3DCCD1}">
-              <a14:hiddenFill xmlns="" xmlns:a14="http://schemas.microsoft.com/office/drawing/2010/main">
+              <a14:hiddenFill xmlns:a14="http://schemas.microsoft.com/office/drawing/2010/main" xmlns="">
                 <a:solidFill>
                   <a:srgbClr val="FFFFFF"/>
                 </a:solidFill>
               </a14:hiddenFill>
             </a:ext>
             <a:ext uri="{91240B29-F687-4f45-9708-019B960494DF}">
-              <a14:hiddenLine xmlns="" xmlns:a14="http://schemas.microsoft.com/office/drawing/2010/main" w="9525">
+              <a14:hiddenLine xmlns:a14="http://schemas.microsoft.com/office/drawing/2010/main" xmlns="" w="9525">
                 <a:solidFill>
                   <a:srgbClr val="000000"/>
                 </a:solidFill>
@@ -17116,14 +17116,14 @@
           </a:ln>
           <a:extLst>
             <a:ext uri="{909E8E84-426E-40dd-AFC4-6F175D3DCCD1}">
-              <a14:hiddenFill xmlns="" xmlns:a14="http://schemas.microsoft.com/office/drawing/2010/main">
+              <a14:hiddenFill xmlns:a14="http://schemas.microsoft.com/office/drawing/2010/main" xmlns="">
                 <a:solidFill>
                   <a:srgbClr val="FFFFFF"/>
                 </a:solidFill>
               </a14:hiddenFill>
             </a:ext>
             <a:ext uri="{91240B29-F687-4f45-9708-019B960494DF}">
-              <a14:hiddenLine xmlns="" xmlns:a14="http://schemas.microsoft.com/office/drawing/2010/main" w="9525">
+              <a14:hiddenLine xmlns:a14="http://schemas.microsoft.com/office/drawing/2010/main" xmlns="" w="9525">
                 <a:solidFill>
                   <a:srgbClr val="000000"/>
                 </a:solidFill>
@@ -17352,7 +17352,7 @@
               <a:pPr>
                 <a:defRPr/>
               </a:pPr>
-              <a:t>22.8.2018</a:t>
+              <a:t>12.9.2018</a:t>
             </a:fld>
             <a:endParaRPr dirty="0"/>
           </a:p>
@@ -17423,14 +17423,14 @@
           </a:ln>
           <a:extLst>
             <a:ext uri="{909E8E84-426E-40dd-AFC4-6F175D3DCCD1}">
-              <a14:hiddenFill xmlns="" xmlns:a14="http://schemas.microsoft.com/office/drawing/2010/main">
+              <a14:hiddenFill xmlns:a14="http://schemas.microsoft.com/office/drawing/2010/main" xmlns="">
                 <a:solidFill>
                   <a:srgbClr val="FFFFFF"/>
                 </a:solidFill>
               </a14:hiddenFill>
             </a:ext>
             <a:ext uri="{91240B29-F687-4f45-9708-019B960494DF}">
-              <a14:hiddenLine xmlns="" xmlns:a14="http://schemas.microsoft.com/office/drawing/2010/main" w="9525">
+              <a14:hiddenLine xmlns:a14="http://schemas.microsoft.com/office/drawing/2010/main" xmlns="" w="9525">
                 <a:solidFill>
                   <a:srgbClr val="000000"/>
                 </a:solidFill>
@@ -17507,14 +17507,14 @@
           </a:ln>
           <a:extLst>
             <a:ext uri="{909E8E84-426E-40dd-AFC4-6F175D3DCCD1}">
-              <a14:hiddenFill xmlns="" xmlns:a14="http://schemas.microsoft.com/office/drawing/2010/main">
+              <a14:hiddenFill xmlns:a14="http://schemas.microsoft.com/office/drawing/2010/main" xmlns="">
                 <a:solidFill>
                   <a:srgbClr val="FFFFFF"/>
                 </a:solidFill>
               </a14:hiddenFill>
             </a:ext>
             <a:ext uri="{91240B29-F687-4f45-9708-019B960494DF}">
-              <a14:hiddenLine xmlns="" xmlns:a14="http://schemas.microsoft.com/office/drawing/2010/main" w="9525">
+              <a14:hiddenLine xmlns:a14="http://schemas.microsoft.com/office/drawing/2010/main" xmlns="" w="9525">
                 <a:solidFill>
                   <a:srgbClr val="000000"/>
                 </a:solidFill>
@@ -17591,14 +17591,14 @@
           </a:ln>
           <a:extLst>
             <a:ext uri="{909E8E84-426E-40dd-AFC4-6F175D3DCCD1}">
-              <a14:hiddenFill xmlns="" xmlns:a14="http://schemas.microsoft.com/office/drawing/2010/main">
+              <a14:hiddenFill xmlns:a14="http://schemas.microsoft.com/office/drawing/2010/main" xmlns="">
                 <a:solidFill>
                   <a:srgbClr val="FFFFFF"/>
                 </a:solidFill>
               </a14:hiddenFill>
             </a:ext>
             <a:ext uri="{91240B29-F687-4f45-9708-019B960494DF}">
-              <a14:hiddenLine xmlns="" xmlns:a14="http://schemas.microsoft.com/office/drawing/2010/main" w="9525">
+              <a14:hiddenLine xmlns:a14="http://schemas.microsoft.com/office/drawing/2010/main" xmlns="" w="9525">
                 <a:solidFill>
                   <a:srgbClr val="000000"/>
                 </a:solidFill>
@@ -17675,14 +17675,14 @@
           </a:ln>
           <a:extLst>
             <a:ext uri="{909E8E84-426E-40dd-AFC4-6F175D3DCCD1}">
-              <a14:hiddenFill xmlns="" xmlns:a14="http://schemas.microsoft.com/office/drawing/2010/main">
+              <a14:hiddenFill xmlns:a14="http://schemas.microsoft.com/office/drawing/2010/main" xmlns="">
                 <a:solidFill>
                   <a:srgbClr val="FFFFFF"/>
                 </a:solidFill>
               </a14:hiddenFill>
             </a:ext>
             <a:ext uri="{91240B29-F687-4f45-9708-019B960494DF}">
-              <a14:hiddenLine xmlns="" xmlns:a14="http://schemas.microsoft.com/office/drawing/2010/main" w="9525">
+              <a14:hiddenLine xmlns:a14="http://schemas.microsoft.com/office/drawing/2010/main" xmlns="" w="9525">
                 <a:solidFill>
                   <a:srgbClr val="000000"/>
                 </a:solidFill>
@@ -17759,14 +17759,14 @@
           </a:ln>
           <a:extLst>
             <a:ext uri="{909E8E84-426E-40dd-AFC4-6F175D3DCCD1}">
-              <a14:hiddenFill xmlns="" xmlns:a14="http://schemas.microsoft.com/office/drawing/2010/main">
+              <a14:hiddenFill xmlns:a14="http://schemas.microsoft.com/office/drawing/2010/main" xmlns="">
                 <a:solidFill>
                   <a:srgbClr val="FFFFFF"/>
                 </a:solidFill>
               </a14:hiddenFill>
             </a:ext>
             <a:ext uri="{91240B29-F687-4f45-9708-019B960494DF}">
-              <a14:hiddenLine xmlns="" xmlns:a14="http://schemas.microsoft.com/office/drawing/2010/main" w="9525">
+              <a14:hiddenLine xmlns:a14="http://schemas.microsoft.com/office/drawing/2010/main" xmlns="" w="9525">
                 <a:solidFill>
                   <a:srgbClr val="000000"/>
                 </a:solidFill>
@@ -17813,14 +17813,14 @@
           </a:ln>
           <a:extLst>
             <a:ext uri="{909E8E84-426E-40dd-AFC4-6F175D3DCCD1}">
-              <a14:hiddenFill xmlns="" xmlns:a14="http://schemas.microsoft.com/office/drawing/2010/main">
+              <a14:hiddenFill xmlns:a14="http://schemas.microsoft.com/office/drawing/2010/main" xmlns="">
                 <a:solidFill>
                   <a:srgbClr val="FFFFFF"/>
                 </a:solidFill>
               </a14:hiddenFill>
             </a:ext>
             <a:ext uri="{91240B29-F687-4f45-9708-019B960494DF}">
-              <a14:hiddenLine xmlns="" xmlns:a14="http://schemas.microsoft.com/office/drawing/2010/main" w="9525">
+              <a14:hiddenLine xmlns:a14="http://schemas.microsoft.com/office/drawing/2010/main" xmlns="" w="9525">
                 <a:solidFill>
                   <a:srgbClr val="000000"/>
                 </a:solidFill>
@@ -17897,14 +17897,14 @@
           </a:ln>
           <a:extLst>
             <a:ext uri="{909E8E84-426E-40dd-AFC4-6F175D3DCCD1}">
-              <a14:hiddenFill xmlns="" xmlns:a14="http://schemas.microsoft.com/office/drawing/2010/main">
+              <a14:hiddenFill xmlns:a14="http://schemas.microsoft.com/office/drawing/2010/main" xmlns="">
                 <a:solidFill>
                   <a:srgbClr val="FFFFFF"/>
                 </a:solidFill>
               </a14:hiddenFill>
             </a:ext>
             <a:ext uri="{91240B29-F687-4f45-9708-019B960494DF}">
-              <a14:hiddenLine xmlns="" xmlns:a14="http://schemas.microsoft.com/office/drawing/2010/main" w="9525">
+              <a14:hiddenLine xmlns:a14="http://schemas.microsoft.com/office/drawing/2010/main" xmlns="" w="9525">
                 <a:solidFill>
                   <a:srgbClr val="000000"/>
                 </a:solidFill>
@@ -17981,14 +17981,14 @@
           </a:ln>
           <a:extLst>
             <a:ext uri="{909E8E84-426E-40dd-AFC4-6F175D3DCCD1}">
-              <a14:hiddenFill xmlns="" xmlns:a14="http://schemas.microsoft.com/office/drawing/2010/main">
+              <a14:hiddenFill xmlns:a14="http://schemas.microsoft.com/office/drawing/2010/main" xmlns="">
                 <a:solidFill>
                   <a:srgbClr val="FFFFFF"/>
                 </a:solidFill>
               </a14:hiddenFill>
             </a:ext>
             <a:ext uri="{91240B29-F687-4f45-9708-019B960494DF}">
-              <a14:hiddenLine xmlns="" xmlns:a14="http://schemas.microsoft.com/office/drawing/2010/main" w="9525">
+              <a14:hiddenLine xmlns:a14="http://schemas.microsoft.com/office/drawing/2010/main" xmlns="" w="9525">
                 <a:solidFill>
                   <a:srgbClr val="000000"/>
                 </a:solidFill>
@@ -18035,14 +18035,14 @@
           </a:ln>
           <a:extLst>
             <a:ext uri="{909E8E84-426E-40dd-AFC4-6F175D3DCCD1}">
-              <a14:hiddenFill xmlns="" xmlns:a14="http://schemas.microsoft.com/office/drawing/2010/main">
+              <a14:hiddenFill xmlns:a14="http://schemas.microsoft.com/office/drawing/2010/main" xmlns="">
                 <a:solidFill>
                   <a:srgbClr val="FFFFFF"/>
                 </a:solidFill>
               </a14:hiddenFill>
             </a:ext>
             <a:ext uri="{91240B29-F687-4f45-9708-019B960494DF}">
-              <a14:hiddenLine xmlns="" xmlns:a14="http://schemas.microsoft.com/office/drawing/2010/main" w="9525">
+              <a14:hiddenLine xmlns:a14="http://schemas.microsoft.com/office/drawing/2010/main" xmlns="" w="9525">
                 <a:solidFill>
                   <a:srgbClr val="000000"/>
                 </a:solidFill>
@@ -18152,7 +18152,7 @@
               <a:pPr>
                 <a:defRPr/>
               </a:pPr>
-              <a:t>22.8.2018</a:t>
+              <a:t>12.9.2018</a:t>
             </a:fld>
             <a:endParaRPr dirty="0"/>
           </a:p>
@@ -18223,14 +18223,14 @@
           </a:ln>
           <a:extLst>
             <a:ext uri="{909E8E84-426E-40dd-AFC4-6F175D3DCCD1}">
-              <a14:hiddenFill xmlns="" xmlns:a14="http://schemas.microsoft.com/office/drawing/2010/main">
+              <a14:hiddenFill xmlns:a14="http://schemas.microsoft.com/office/drawing/2010/main" xmlns="">
                 <a:solidFill>
                   <a:srgbClr val="FFFFFF"/>
                 </a:solidFill>
               </a14:hiddenFill>
             </a:ext>
             <a:ext uri="{91240B29-F687-4f45-9708-019B960494DF}">
-              <a14:hiddenLine xmlns="" xmlns:a14="http://schemas.microsoft.com/office/drawing/2010/main" w="9525">
+              <a14:hiddenLine xmlns:a14="http://schemas.microsoft.com/office/drawing/2010/main" xmlns="" w="9525">
                 <a:solidFill>
                   <a:srgbClr val="000000"/>
                 </a:solidFill>
@@ -18277,14 +18277,14 @@
           </a:ln>
           <a:extLst>
             <a:ext uri="{909E8E84-426E-40dd-AFC4-6F175D3DCCD1}">
-              <a14:hiddenFill xmlns="" xmlns:a14="http://schemas.microsoft.com/office/drawing/2010/main">
+              <a14:hiddenFill xmlns:a14="http://schemas.microsoft.com/office/drawing/2010/main" xmlns="">
                 <a:solidFill>
                   <a:srgbClr val="FFFFFF"/>
                 </a:solidFill>
               </a14:hiddenFill>
             </a:ext>
             <a:ext uri="{91240B29-F687-4f45-9708-019B960494DF}">
-              <a14:hiddenLine xmlns="" xmlns:a14="http://schemas.microsoft.com/office/drawing/2010/main" w="9525">
+              <a14:hiddenLine xmlns:a14="http://schemas.microsoft.com/office/drawing/2010/main" xmlns="" w="9525">
                 <a:solidFill>
                   <a:srgbClr val="000000"/>
                 </a:solidFill>
@@ -18394,7 +18394,7 @@
               <a:pPr>
                 <a:defRPr/>
               </a:pPr>
-              <a:t>22.8.2018</a:t>
+              <a:t>12.9.2018</a:t>
             </a:fld>
             <a:endParaRPr dirty="0"/>
           </a:p>
@@ -18465,14 +18465,14 @@
           </a:ln>
           <a:extLst>
             <a:ext uri="{909E8E84-426E-40dd-AFC4-6F175D3DCCD1}">
-              <a14:hiddenFill xmlns="" xmlns:a14="http://schemas.microsoft.com/office/drawing/2010/main">
+              <a14:hiddenFill xmlns:a14="http://schemas.microsoft.com/office/drawing/2010/main" xmlns="">
                 <a:solidFill>
                   <a:srgbClr val="FFFFFF"/>
                 </a:solidFill>
               </a14:hiddenFill>
             </a:ext>
             <a:ext uri="{91240B29-F687-4f45-9708-019B960494DF}">
-              <a14:hiddenLine xmlns="" xmlns:a14="http://schemas.microsoft.com/office/drawing/2010/main" w="9525">
+              <a14:hiddenLine xmlns:a14="http://schemas.microsoft.com/office/drawing/2010/main" xmlns="" w="9525">
                 <a:solidFill>
                   <a:srgbClr val="000000"/>
                 </a:solidFill>
@@ -18519,14 +18519,14 @@
           </a:ln>
           <a:extLst>
             <a:ext uri="{909E8E84-426E-40dd-AFC4-6F175D3DCCD1}">
-              <a14:hiddenFill xmlns="" xmlns:a14="http://schemas.microsoft.com/office/drawing/2010/main">
+              <a14:hiddenFill xmlns:a14="http://schemas.microsoft.com/office/drawing/2010/main" xmlns="">
                 <a:solidFill>
                   <a:srgbClr val="FFFFFF"/>
                 </a:solidFill>
               </a14:hiddenFill>
             </a:ext>
             <a:ext uri="{91240B29-F687-4f45-9708-019B960494DF}">
-              <a14:hiddenLine xmlns="" xmlns:a14="http://schemas.microsoft.com/office/drawing/2010/main" w="9525">
+              <a14:hiddenLine xmlns:a14="http://schemas.microsoft.com/office/drawing/2010/main" xmlns="" w="9525">
                 <a:solidFill>
                   <a:srgbClr val="000000"/>
                 </a:solidFill>
@@ -18636,7 +18636,7 @@
               <a:pPr>
                 <a:defRPr/>
               </a:pPr>
-              <a:t>22.8.2018</a:t>
+              <a:t>12.9.2018</a:t>
             </a:fld>
             <a:endParaRPr dirty="0"/>
           </a:p>
@@ -18707,14 +18707,14 @@
           </a:ln>
           <a:extLst>
             <a:ext uri="{909E8E84-426E-40dd-AFC4-6F175D3DCCD1}">
-              <a14:hiddenFill xmlns="" xmlns:a14="http://schemas.microsoft.com/office/drawing/2010/main">
+              <a14:hiddenFill xmlns:a14="http://schemas.microsoft.com/office/drawing/2010/main" xmlns="">
                 <a:solidFill>
                   <a:srgbClr val="FFFFFF"/>
                 </a:solidFill>
               </a14:hiddenFill>
             </a:ext>
             <a:ext uri="{91240B29-F687-4f45-9708-019B960494DF}">
-              <a14:hiddenLine xmlns="" xmlns:a14="http://schemas.microsoft.com/office/drawing/2010/main" w="9525">
+              <a14:hiddenLine xmlns:a14="http://schemas.microsoft.com/office/drawing/2010/main" xmlns="" w="9525">
                 <a:solidFill>
                   <a:srgbClr val="000000"/>
                 </a:solidFill>
@@ -18761,14 +18761,14 @@
           </a:ln>
           <a:extLst>
             <a:ext uri="{909E8E84-426E-40dd-AFC4-6F175D3DCCD1}">
-              <a14:hiddenFill xmlns="" xmlns:a14="http://schemas.microsoft.com/office/drawing/2010/main">
+              <a14:hiddenFill xmlns:a14="http://schemas.microsoft.com/office/drawing/2010/main" xmlns="">
                 <a:solidFill>
                   <a:srgbClr val="FFFFFF"/>
                 </a:solidFill>
               </a14:hiddenFill>
             </a:ext>
             <a:ext uri="{91240B29-F687-4f45-9708-019B960494DF}">
-              <a14:hiddenLine xmlns="" xmlns:a14="http://schemas.microsoft.com/office/drawing/2010/main" w="9525">
+              <a14:hiddenLine xmlns:a14="http://schemas.microsoft.com/office/drawing/2010/main" xmlns="" w="9525">
                 <a:solidFill>
                   <a:srgbClr val="000000"/>
                 </a:solidFill>
@@ -18875,7 +18875,7 @@
               <a:pPr>
                 <a:defRPr/>
               </a:pPr>
-              <a:t>22.8.2018</a:t>
+              <a:t>12.9.2018</a:t>
             </a:fld>
             <a:endParaRPr dirty="0"/>
           </a:p>
@@ -18946,14 +18946,14 @@
           </a:ln>
           <a:extLst>
             <a:ext uri="{909E8E84-426E-40dd-AFC4-6F175D3DCCD1}">
-              <a14:hiddenFill xmlns="" xmlns:a14="http://schemas.microsoft.com/office/drawing/2010/main">
+              <a14:hiddenFill xmlns:a14="http://schemas.microsoft.com/office/drawing/2010/main" xmlns="">
                 <a:solidFill>
                   <a:srgbClr val="FFFFFF"/>
                 </a:solidFill>
               </a14:hiddenFill>
             </a:ext>
             <a:ext uri="{91240B29-F687-4f45-9708-019B960494DF}">
-              <a14:hiddenLine xmlns="" xmlns:a14="http://schemas.microsoft.com/office/drawing/2010/main" w="9525">
+              <a14:hiddenLine xmlns:a14="http://schemas.microsoft.com/office/drawing/2010/main" xmlns="" w="9525">
                 <a:solidFill>
                   <a:srgbClr val="000000"/>
                 </a:solidFill>
@@ -19000,14 +19000,14 @@
           </a:ln>
           <a:extLst>
             <a:ext uri="{909E8E84-426E-40dd-AFC4-6F175D3DCCD1}">
-              <a14:hiddenFill xmlns="" xmlns:a14="http://schemas.microsoft.com/office/drawing/2010/main">
+              <a14:hiddenFill xmlns:a14="http://schemas.microsoft.com/office/drawing/2010/main" xmlns="">
                 <a:solidFill>
                   <a:srgbClr val="FFFFFF"/>
                 </a:solidFill>
               </a14:hiddenFill>
             </a:ext>
             <a:ext uri="{91240B29-F687-4f45-9708-019B960494DF}">
-              <a14:hiddenLine xmlns="" xmlns:a14="http://schemas.microsoft.com/office/drawing/2010/main" w="9525">
+              <a14:hiddenLine xmlns:a14="http://schemas.microsoft.com/office/drawing/2010/main" xmlns="" w="9525">
                 <a:solidFill>
                   <a:srgbClr val="000000"/>
                 </a:solidFill>
@@ -19263,7 +19263,7 @@
               <a:pPr>
                 <a:defRPr/>
               </a:pPr>
-              <a:t>22.8.2018</a:t>
+              <a:t>12.9.2018</a:t>
             </a:fld>
             <a:endParaRPr dirty="0"/>
           </a:p>
@@ -19485,7 +19485,7 @@
               <a:pPr>
                 <a:defRPr/>
               </a:pPr>
-              <a:t>22.8.2018</a:t>
+              <a:t>12.9.2018</a:t>
             </a:fld>
             <a:endParaRPr dirty="0"/>
           </a:p>
@@ -19556,14 +19556,14 @@
           </a:ln>
           <a:extLst>
             <a:ext uri="{909E8E84-426E-40dd-AFC4-6F175D3DCCD1}">
-              <a14:hiddenFill xmlns="" xmlns:a14="http://schemas.microsoft.com/office/drawing/2010/main">
+              <a14:hiddenFill xmlns:a14="http://schemas.microsoft.com/office/drawing/2010/main" xmlns="">
                 <a:solidFill>
                   <a:srgbClr val="FFFFFF"/>
                 </a:solidFill>
               </a14:hiddenFill>
             </a:ext>
             <a:ext uri="{91240B29-F687-4f45-9708-019B960494DF}">
-              <a14:hiddenLine xmlns="" xmlns:a14="http://schemas.microsoft.com/office/drawing/2010/main" w="9525">
+              <a14:hiddenLine xmlns:a14="http://schemas.microsoft.com/office/drawing/2010/main" xmlns="" w="9525">
                 <a:solidFill>
                   <a:srgbClr val="000000"/>
                 </a:solidFill>
@@ -19610,14 +19610,14 @@
           </a:ln>
           <a:extLst>
             <a:ext uri="{909E8E84-426E-40dd-AFC4-6F175D3DCCD1}">
-              <a14:hiddenFill xmlns="" xmlns:a14="http://schemas.microsoft.com/office/drawing/2010/main">
+              <a14:hiddenFill xmlns:a14="http://schemas.microsoft.com/office/drawing/2010/main" xmlns="">
                 <a:solidFill>
                   <a:srgbClr val="FFFFFF"/>
                 </a:solidFill>
               </a14:hiddenFill>
             </a:ext>
             <a:ext uri="{91240B29-F687-4f45-9708-019B960494DF}">
-              <a14:hiddenLine xmlns="" xmlns:a14="http://schemas.microsoft.com/office/drawing/2010/main" w="9525">
+              <a14:hiddenLine xmlns:a14="http://schemas.microsoft.com/office/drawing/2010/main" xmlns="" w="9525">
                 <a:solidFill>
                   <a:srgbClr val="000000"/>
                 </a:solidFill>
@@ -19872,7 +19872,7 @@
               <a:pPr>
                 <a:defRPr/>
               </a:pPr>
-              <a:t>22.8.2018</a:t>
+              <a:t>12.9.2018</a:t>
             </a:fld>
             <a:endParaRPr dirty="0"/>
           </a:p>
@@ -20089,14 +20089,14 @@
             </a:ln>
             <a:extLst>
               <a:ext uri="{909E8E84-426E-40dd-AFC4-6F175D3DCCD1}">
-                <a14:hiddenFill xmlns="" xmlns:a14="http://schemas.microsoft.com/office/drawing/2010/main">
+                <a14:hiddenFill xmlns:a14="http://schemas.microsoft.com/office/drawing/2010/main" xmlns="">
                   <a:solidFill>
                     <a:srgbClr val="FFFFFF"/>
                   </a:solidFill>
                 </a14:hiddenFill>
               </a:ext>
               <a:ext uri="{91240B29-F687-4f45-9708-019B960494DF}">
-                <a14:hiddenLine xmlns="" xmlns:a14="http://schemas.microsoft.com/office/drawing/2010/main" w="9525">
+                <a14:hiddenLine xmlns:a14="http://schemas.microsoft.com/office/drawing/2010/main" xmlns="" w="9525">
                   <a:solidFill>
                     <a:srgbClr val="000000"/>
                   </a:solidFill>
@@ -20200,14 +20200,14 @@
           </a:ln>
           <a:extLst>
             <a:ext uri="{909E8E84-426E-40dd-AFC4-6F175D3DCCD1}">
-              <a14:hiddenFill xmlns="" xmlns:a14="http://schemas.microsoft.com/office/drawing/2010/main">
+              <a14:hiddenFill xmlns:a14="http://schemas.microsoft.com/office/drawing/2010/main" xmlns="">
                 <a:solidFill>
                   <a:srgbClr val="FFFFFF"/>
                 </a:solidFill>
               </a14:hiddenFill>
             </a:ext>
             <a:ext uri="{91240B29-F687-4f45-9708-019B960494DF}">
-              <a14:hiddenLine xmlns="" xmlns:a14="http://schemas.microsoft.com/office/drawing/2010/main" w="9525">
+              <a14:hiddenLine xmlns:a14="http://schemas.microsoft.com/office/drawing/2010/main" xmlns="" w="9525">
                 <a:solidFill>
                   <a:srgbClr val="000000"/>
                 </a:solidFill>
@@ -20318,14 +20318,14 @@
           </a:ln>
           <a:extLst>
             <a:ext uri="{909E8E84-426E-40dd-AFC4-6F175D3DCCD1}">
-              <a14:hiddenFill xmlns="" xmlns:a14="http://schemas.microsoft.com/office/drawing/2010/main">
+              <a14:hiddenFill xmlns:a14="http://schemas.microsoft.com/office/drawing/2010/main" xmlns="">
                 <a:solidFill>
                   <a:srgbClr val="FFFFFF"/>
                 </a:solidFill>
               </a14:hiddenFill>
             </a:ext>
             <a:ext uri="{91240B29-F687-4f45-9708-019B960494DF}">
-              <a14:hiddenLine xmlns="" xmlns:a14="http://schemas.microsoft.com/office/drawing/2010/main" w="9525">
+              <a14:hiddenLine xmlns:a14="http://schemas.microsoft.com/office/drawing/2010/main" xmlns="" w="9525">
                 <a:solidFill>
                   <a:srgbClr val="000000"/>
                 </a:solidFill>
@@ -20502,14 +20502,14 @@
             </a:ln>
             <a:extLst>
               <a:ext uri="{909E8E84-426E-40dd-AFC4-6F175D3DCCD1}">
-                <a14:hiddenFill xmlns="" xmlns:a14="http://schemas.microsoft.com/office/drawing/2010/main">
+                <a14:hiddenFill xmlns:a14="http://schemas.microsoft.com/office/drawing/2010/main" xmlns="">
                   <a:solidFill>
                     <a:srgbClr val="FFFFFF"/>
                   </a:solidFill>
                 </a14:hiddenFill>
               </a:ext>
               <a:ext uri="{91240B29-F687-4f45-9708-019B960494DF}">
-                <a14:hiddenLine xmlns="" xmlns:a14="http://schemas.microsoft.com/office/drawing/2010/main" w="9525">
+                <a14:hiddenLine xmlns:a14="http://schemas.microsoft.com/office/drawing/2010/main" xmlns="" w="9525">
                   <a:solidFill>
                     <a:srgbClr val="000000"/>
                   </a:solidFill>
@@ -20613,14 +20613,14 @@
           </a:ln>
           <a:extLst>
             <a:ext uri="{909E8E84-426E-40dd-AFC4-6F175D3DCCD1}">
-              <a14:hiddenFill xmlns="" xmlns:a14="http://schemas.microsoft.com/office/drawing/2010/main">
+              <a14:hiddenFill xmlns:a14="http://schemas.microsoft.com/office/drawing/2010/main" xmlns="">
                 <a:solidFill>
                   <a:srgbClr val="FFFFFF"/>
                 </a:solidFill>
               </a14:hiddenFill>
             </a:ext>
             <a:ext uri="{91240B29-F687-4f45-9708-019B960494DF}">
-              <a14:hiddenLine xmlns="" xmlns:a14="http://schemas.microsoft.com/office/drawing/2010/main" w="9525">
+              <a14:hiddenLine xmlns:a14="http://schemas.microsoft.com/office/drawing/2010/main" xmlns="" w="9525">
                 <a:solidFill>
                   <a:srgbClr val="000000"/>
                 </a:solidFill>
@@ -20895,14 +20895,14 @@
             </a:ln>
             <a:extLst>
               <a:ext uri="{909E8E84-426E-40dd-AFC4-6F175D3DCCD1}">
-                <a14:hiddenFill xmlns="" xmlns:a14="http://schemas.microsoft.com/office/drawing/2010/main">
+                <a14:hiddenFill xmlns:a14="http://schemas.microsoft.com/office/drawing/2010/main" xmlns="">
                   <a:solidFill>
                     <a:srgbClr val="FFFFFF"/>
                   </a:solidFill>
                 </a14:hiddenFill>
               </a:ext>
               <a:ext uri="{91240B29-F687-4f45-9708-019B960494DF}">
-                <a14:hiddenLine xmlns="" xmlns:a14="http://schemas.microsoft.com/office/drawing/2010/main" w="9525">
+                <a14:hiddenLine xmlns:a14="http://schemas.microsoft.com/office/drawing/2010/main" xmlns="" w="9525">
                   <a:solidFill>
                     <a:srgbClr val="000000"/>
                   </a:solidFill>
@@ -21006,14 +21006,14 @@
           </a:ln>
           <a:extLst>
             <a:ext uri="{909E8E84-426E-40dd-AFC4-6F175D3DCCD1}">
-              <a14:hiddenFill xmlns="" xmlns:a14="http://schemas.microsoft.com/office/drawing/2010/main">
+              <a14:hiddenFill xmlns:a14="http://schemas.microsoft.com/office/drawing/2010/main" xmlns="">
                 <a:solidFill>
                   <a:srgbClr val="FFFFFF"/>
                 </a:solidFill>
               </a14:hiddenFill>
             </a:ext>
             <a:ext uri="{91240B29-F687-4f45-9708-019B960494DF}">
-              <a14:hiddenLine xmlns="" xmlns:a14="http://schemas.microsoft.com/office/drawing/2010/main" w="9525">
+              <a14:hiddenLine xmlns:a14="http://schemas.microsoft.com/office/drawing/2010/main" xmlns="" w="9525">
                 <a:solidFill>
                   <a:srgbClr val="000000"/>
                 </a:solidFill>
@@ -21208,14 +21208,14 @@
             </a:ln>
             <a:extLst>
               <a:ext uri="{909E8E84-426E-40dd-AFC4-6F175D3DCCD1}">
-                <a14:hiddenFill xmlns="" xmlns:a14="http://schemas.microsoft.com/office/drawing/2010/main">
+                <a14:hiddenFill xmlns:a14="http://schemas.microsoft.com/office/drawing/2010/main" xmlns="">
                   <a:solidFill>
                     <a:srgbClr val="FFFFFF"/>
                   </a:solidFill>
                 </a14:hiddenFill>
               </a:ext>
               <a:ext uri="{91240B29-F687-4f45-9708-019B960494DF}">
-                <a14:hiddenLine xmlns="" xmlns:a14="http://schemas.microsoft.com/office/drawing/2010/main" w="9525">
+                <a14:hiddenLine xmlns:a14="http://schemas.microsoft.com/office/drawing/2010/main" xmlns="" w="9525">
                   <a:solidFill>
                     <a:srgbClr val="000000"/>
                   </a:solidFill>
@@ -21319,14 +21319,14 @@
           </a:ln>
           <a:extLst>
             <a:ext uri="{909E8E84-426E-40dd-AFC4-6F175D3DCCD1}">
-              <a14:hiddenFill xmlns="" xmlns:a14="http://schemas.microsoft.com/office/drawing/2010/main">
+              <a14:hiddenFill xmlns:a14="http://schemas.microsoft.com/office/drawing/2010/main" xmlns="">
                 <a:solidFill>
                   <a:srgbClr val="FFFFFF"/>
                 </a:solidFill>
               </a14:hiddenFill>
             </a:ext>
             <a:ext uri="{91240B29-F687-4f45-9708-019B960494DF}">
-              <a14:hiddenLine xmlns="" xmlns:a14="http://schemas.microsoft.com/office/drawing/2010/main" w="9525">
+              <a14:hiddenLine xmlns:a14="http://schemas.microsoft.com/office/drawing/2010/main" xmlns="" w="9525">
                 <a:solidFill>
                   <a:srgbClr val="000000"/>
                 </a:solidFill>
@@ -21568,14 +21568,14 @@
           </a:ln>
           <a:extLst>
             <a:ext uri="{909E8E84-426E-40dd-AFC4-6F175D3DCCD1}">
-              <a14:hiddenFill xmlns="" xmlns:a14="http://schemas.microsoft.com/office/drawing/2010/main">
+              <a14:hiddenFill xmlns:a14="http://schemas.microsoft.com/office/drawing/2010/main" xmlns="">
                 <a:solidFill>
                   <a:srgbClr val="FFFFFF"/>
                 </a:solidFill>
               </a14:hiddenFill>
             </a:ext>
             <a:ext uri="{91240B29-F687-4f45-9708-019B960494DF}">
-              <a14:hiddenLine xmlns="" xmlns:a14="http://schemas.microsoft.com/office/drawing/2010/main" w="9525">
+              <a14:hiddenLine xmlns:a14="http://schemas.microsoft.com/office/drawing/2010/main" xmlns="" w="9525">
                 <a:solidFill>
                   <a:srgbClr val="000000"/>
                 </a:solidFill>
@@ -21853,14 +21853,14 @@
             </a:ln>
             <a:extLst>
               <a:ext uri="{909E8E84-426E-40dd-AFC4-6F175D3DCCD1}">
-                <a14:hiddenFill xmlns="" xmlns:a14="http://schemas.microsoft.com/office/drawing/2010/main">
+                <a14:hiddenFill xmlns:a14="http://schemas.microsoft.com/office/drawing/2010/main" xmlns="">
                   <a:solidFill>
                     <a:srgbClr val="FFFFFF"/>
                   </a:solidFill>
                 </a14:hiddenFill>
               </a:ext>
               <a:ext uri="{91240B29-F687-4f45-9708-019B960494DF}">
-                <a14:hiddenLine xmlns="" xmlns:a14="http://schemas.microsoft.com/office/drawing/2010/main" w="9525">
+                <a14:hiddenLine xmlns:a14="http://schemas.microsoft.com/office/drawing/2010/main" xmlns="" w="9525">
                   <a:solidFill>
                     <a:srgbClr val="000000"/>
                   </a:solidFill>
@@ -21964,14 +21964,14 @@
           </a:ln>
           <a:extLst>
             <a:ext uri="{909E8E84-426E-40dd-AFC4-6F175D3DCCD1}">
-              <a14:hiddenFill xmlns="" xmlns:a14="http://schemas.microsoft.com/office/drawing/2010/main">
+              <a14:hiddenFill xmlns:a14="http://schemas.microsoft.com/office/drawing/2010/main" xmlns="">
                 <a:solidFill>
                   <a:srgbClr val="FFFFFF"/>
                 </a:solidFill>
               </a14:hiddenFill>
             </a:ext>
             <a:ext uri="{91240B29-F687-4f45-9708-019B960494DF}">
-              <a14:hiddenLine xmlns="" xmlns:a14="http://schemas.microsoft.com/office/drawing/2010/main" w="9525">
+              <a14:hiddenLine xmlns:a14="http://schemas.microsoft.com/office/drawing/2010/main" xmlns="" w="9525">
                 <a:solidFill>
                   <a:srgbClr val="000000"/>
                 </a:solidFill>
@@ -22285,14 +22285,14 @@
           </a:ln>
           <a:extLst>
             <a:ext uri="{909E8E84-426E-40dd-AFC4-6F175D3DCCD1}">
-              <a14:hiddenFill xmlns="" xmlns:a14="http://schemas.microsoft.com/office/drawing/2010/main">
+              <a14:hiddenFill xmlns:a14="http://schemas.microsoft.com/office/drawing/2010/main" xmlns="">
                 <a:solidFill>
                   <a:srgbClr val="FFFFFF"/>
                 </a:solidFill>
               </a14:hiddenFill>
             </a:ext>
             <a:ext uri="{91240B29-F687-4f45-9708-019B960494DF}">
-              <a14:hiddenLine xmlns="" xmlns:a14="http://schemas.microsoft.com/office/drawing/2010/main" w="9525">
+              <a14:hiddenLine xmlns:a14="http://schemas.microsoft.com/office/drawing/2010/main" xmlns="" w="9525">
                 <a:solidFill>
                   <a:srgbClr val="000000"/>
                 </a:solidFill>
@@ -22465,14 +22465,14 @@
             </a:ln>
             <a:extLst>
               <a:ext uri="{909E8E84-426E-40dd-AFC4-6F175D3DCCD1}">
-                <a14:hiddenFill xmlns="" xmlns:a14="http://schemas.microsoft.com/office/drawing/2010/main">
+                <a14:hiddenFill xmlns:a14="http://schemas.microsoft.com/office/drawing/2010/main" xmlns="">
                   <a:solidFill>
                     <a:srgbClr val="FFFFFF"/>
                   </a:solidFill>
                 </a14:hiddenFill>
               </a:ext>
               <a:ext uri="{91240B29-F687-4f45-9708-019B960494DF}">
-                <a14:hiddenLine xmlns="" xmlns:a14="http://schemas.microsoft.com/office/drawing/2010/main" w="9525">
+                <a14:hiddenLine xmlns:a14="http://schemas.microsoft.com/office/drawing/2010/main" xmlns="" w="9525">
                   <a:solidFill>
                     <a:srgbClr val="000000"/>
                   </a:solidFill>
@@ -22576,14 +22576,14 @@
           </a:ln>
           <a:extLst>
             <a:ext uri="{909E8E84-426E-40dd-AFC4-6F175D3DCCD1}">
-              <a14:hiddenFill xmlns="" xmlns:a14="http://schemas.microsoft.com/office/drawing/2010/main">
+              <a14:hiddenFill xmlns:a14="http://schemas.microsoft.com/office/drawing/2010/main" xmlns="">
                 <a:solidFill>
                   <a:srgbClr val="FFFFFF"/>
                 </a:solidFill>
               </a14:hiddenFill>
             </a:ext>
             <a:ext uri="{91240B29-F687-4f45-9708-019B960494DF}">
-              <a14:hiddenLine xmlns="" xmlns:a14="http://schemas.microsoft.com/office/drawing/2010/main" w="9525">
+              <a14:hiddenLine xmlns:a14="http://schemas.microsoft.com/office/drawing/2010/main" xmlns="" w="9525">
                 <a:solidFill>
                   <a:srgbClr val="000000"/>
                 </a:solidFill>
@@ -22740,14 +22740,14 @@
           </a:ln>
           <a:extLst>
             <a:ext uri="{909E8E84-426E-40dd-AFC4-6F175D3DCCD1}">
-              <a14:hiddenFill xmlns="" xmlns:a14="http://schemas.microsoft.com/office/drawing/2010/main">
+              <a14:hiddenFill xmlns:a14="http://schemas.microsoft.com/office/drawing/2010/main" xmlns="">
                 <a:solidFill>
                   <a:srgbClr val="FFFFFF"/>
                 </a:solidFill>
               </a14:hiddenFill>
             </a:ext>
             <a:ext uri="{91240B29-F687-4f45-9708-019B960494DF}">
-              <a14:hiddenLine xmlns="" xmlns:a14="http://schemas.microsoft.com/office/drawing/2010/main" w="9525">
+              <a14:hiddenLine xmlns:a14="http://schemas.microsoft.com/office/drawing/2010/main" xmlns="" w="9525">
                 <a:solidFill>
                   <a:srgbClr val="000000"/>
                 </a:solidFill>
@@ -23125,14 +23125,14 @@
           </a:ln>
           <a:extLst>
             <a:ext uri="{909E8E84-426E-40dd-AFC4-6F175D3DCCD1}">
-              <a14:hiddenFill xmlns="" xmlns:a14="http://schemas.microsoft.com/office/drawing/2010/main">
+              <a14:hiddenFill xmlns:a14="http://schemas.microsoft.com/office/drawing/2010/main" xmlns="">
                 <a:solidFill>
                   <a:srgbClr val="FFFFFF"/>
                 </a:solidFill>
               </a14:hiddenFill>
             </a:ext>
             <a:ext uri="{91240B29-F687-4f45-9708-019B960494DF}">
-              <a14:hiddenLine xmlns="" xmlns:a14="http://schemas.microsoft.com/office/drawing/2010/main" w="9525">
+              <a14:hiddenLine xmlns:a14="http://schemas.microsoft.com/office/drawing/2010/main" xmlns="" w="9525">
                 <a:solidFill>
                   <a:srgbClr val="000000"/>
                 </a:solidFill>
@@ -23179,14 +23179,14 @@
           </a:ln>
           <a:extLst>
             <a:ext uri="{909E8E84-426E-40dd-AFC4-6F175D3DCCD1}">
-              <a14:hiddenFill xmlns="" xmlns:a14="http://schemas.microsoft.com/office/drawing/2010/main">
+              <a14:hiddenFill xmlns:a14="http://schemas.microsoft.com/office/drawing/2010/main" xmlns="">
                 <a:solidFill>
                   <a:srgbClr val="FFFFFF"/>
                 </a:solidFill>
               </a14:hiddenFill>
             </a:ext>
             <a:ext uri="{91240B29-F687-4f45-9708-019B960494DF}">
-              <a14:hiddenLine xmlns="" xmlns:a14="http://schemas.microsoft.com/office/drawing/2010/main" w="9525">
+              <a14:hiddenLine xmlns:a14="http://schemas.microsoft.com/office/drawing/2010/main" xmlns="" w="9525">
                 <a:solidFill>
                   <a:srgbClr val="000000"/>
                 </a:solidFill>
@@ -23632,14 +23632,14 @@
             </a:ln>
             <a:extLst>
               <a:ext uri="{909E8E84-426E-40dd-AFC4-6F175D3DCCD1}">
-                <a14:hiddenFill xmlns="" xmlns:a14="http://schemas.microsoft.com/office/drawing/2010/main">
+                <a14:hiddenFill xmlns:a14="http://schemas.microsoft.com/office/drawing/2010/main" xmlns="">
                   <a:solidFill>
                     <a:srgbClr val="FFFFFF"/>
                   </a:solidFill>
                 </a14:hiddenFill>
               </a:ext>
               <a:ext uri="{91240B29-F687-4f45-9708-019B960494DF}">
-                <a14:hiddenLine xmlns="" xmlns:a14="http://schemas.microsoft.com/office/drawing/2010/main" w="9525">
+                <a14:hiddenLine xmlns:a14="http://schemas.microsoft.com/office/drawing/2010/main" xmlns="" w="9525">
                   <a:solidFill>
                     <a:srgbClr val="000000"/>
                   </a:solidFill>
@@ -23743,14 +23743,14 @@
           </a:ln>
           <a:extLst>
             <a:ext uri="{909E8E84-426E-40dd-AFC4-6F175D3DCCD1}">
-              <a14:hiddenFill xmlns="" xmlns:a14="http://schemas.microsoft.com/office/drawing/2010/main">
+              <a14:hiddenFill xmlns:a14="http://schemas.microsoft.com/office/drawing/2010/main" xmlns="">
                 <a:solidFill>
                   <a:srgbClr val="FFFFFF"/>
                 </a:solidFill>
               </a14:hiddenFill>
             </a:ext>
             <a:ext uri="{91240B29-F687-4f45-9708-019B960494DF}">
-              <a14:hiddenLine xmlns="" xmlns:a14="http://schemas.microsoft.com/office/drawing/2010/main" w="9525">
+              <a14:hiddenLine xmlns:a14="http://schemas.microsoft.com/office/drawing/2010/main" xmlns="" w="9525">
                 <a:solidFill>
                   <a:srgbClr val="000000"/>
                 </a:solidFill>
@@ -24089,14 +24089,14 @@
           </a:ln>
           <a:extLst>
             <a:ext uri="{909E8E84-426E-40dd-AFC4-6F175D3DCCD1}">
-              <a14:hiddenFill xmlns="" xmlns:a14="http://schemas.microsoft.com/office/drawing/2010/main">
+              <a14:hiddenFill xmlns:a14="http://schemas.microsoft.com/office/drawing/2010/main" xmlns="">
                 <a:solidFill>
                   <a:srgbClr val="FFFFFF"/>
                 </a:solidFill>
               </a14:hiddenFill>
             </a:ext>
             <a:ext uri="{91240B29-F687-4f45-9708-019B960494DF}">
-              <a14:hiddenLine xmlns="" xmlns:a14="http://schemas.microsoft.com/office/drawing/2010/main" w="9525">
+              <a14:hiddenLine xmlns:a14="http://schemas.microsoft.com/office/drawing/2010/main" xmlns="" w="9525">
                 <a:solidFill>
                   <a:srgbClr val="000000"/>
                 </a:solidFill>
@@ -24643,14 +24643,14 @@
             </a:ln>
             <a:extLst>
               <a:ext uri="{909E8E84-426E-40dd-AFC4-6F175D3DCCD1}">
-                <a14:hiddenFill xmlns="" xmlns:a14="http://schemas.microsoft.com/office/drawing/2010/main">
+                <a14:hiddenFill xmlns:a14="http://schemas.microsoft.com/office/drawing/2010/main" xmlns="">
                   <a:solidFill>
                     <a:srgbClr val="FFFFFF"/>
                   </a:solidFill>
                 </a14:hiddenFill>
               </a:ext>
               <a:ext uri="{91240B29-F687-4f45-9708-019B960494DF}">
-                <a14:hiddenLine xmlns="" xmlns:a14="http://schemas.microsoft.com/office/drawing/2010/main" w="9525">
+                <a14:hiddenLine xmlns:a14="http://schemas.microsoft.com/office/drawing/2010/main" xmlns="" w="9525">
                   <a:solidFill>
                     <a:srgbClr val="000000"/>
                   </a:solidFill>
@@ -24754,14 +24754,14 @@
           </a:ln>
           <a:extLst>
             <a:ext uri="{909E8E84-426E-40dd-AFC4-6F175D3DCCD1}">
-              <a14:hiddenFill xmlns="" xmlns:a14="http://schemas.microsoft.com/office/drawing/2010/main">
+              <a14:hiddenFill xmlns:a14="http://schemas.microsoft.com/office/drawing/2010/main" xmlns="">
                 <a:solidFill>
                   <a:srgbClr val="FFFFFF"/>
                 </a:solidFill>
               </a14:hiddenFill>
             </a:ext>
             <a:ext uri="{91240B29-F687-4f45-9708-019B960494DF}">
-              <a14:hiddenLine xmlns="" xmlns:a14="http://schemas.microsoft.com/office/drawing/2010/main" w="9525">
+              <a14:hiddenLine xmlns:a14="http://schemas.microsoft.com/office/drawing/2010/main" xmlns="" w="9525">
                 <a:solidFill>
                   <a:srgbClr val="000000"/>
                 </a:solidFill>
@@ -25159,14 +25159,14 @@
           </a:ln>
           <a:extLst>
             <a:ext uri="{909E8E84-426E-40dd-AFC4-6F175D3DCCD1}">
-              <a14:hiddenFill xmlns="" xmlns:a14="http://schemas.microsoft.com/office/drawing/2010/main">
+              <a14:hiddenFill xmlns:a14="http://schemas.microsoft.com/office/drawing/2010/main" xmlns="">
                 <a:solidFill>
                   <a:srgbClr val="FFFFFF"/>
                 </a:solidFill>
               </a14:hiddenFill>
             </a:ext>
             <a:ext uri="{91240B29-F687-4f45-9708-019B960494DF}">
-              <a14:hiddenLine xmlns="" xmlns:a14="http://schemas.microsoft.com/office/drawing/2010/main" w="9525">
+              <a14:hiddenLine xmlns:a14="http://schemas.microsoft.com/office/drawing/2010/main" xmlns="" w="9525">
                 <a:solidFill>
                   <a:srgbClr val="000000"/>
                 </a:solidFill>
@@ -25637,14 +25637,14 @@
           </a:ln>
           <a:extLst>
             <a:ext uri="{909E8E84-426E-40dd-AFC4-6F175D3DCCD1}">
-              <a14:hiddenFill xmlns="" xmlns:a14="http://schemas.microsoft.com/office/drawing/2010/main">
+              <a14:hiddenFill xmlns:a14="http://schemas.microsoft.com/office/drawing/2010/main" xmlns="">
                 <a:solidFill>
                   <a:srgbClr val="FFFFFF"/>
                 </a:solidFill>
               </a14:hiddenFill>
             </a:ext>
             <a:ext uri="{91240B29-F687-4f45-9708-019B960494DF}">
-              <a14:hiddenLine xmlns="" xmlns:a14="http://schemas.microsoft.com/office/drawing/2010/main" w="9525">
+              <a14:hiddenLine xmlns:a14="http://schemas.microsoft.com/office/drawing/2010/main" xmlns="" w="9525">
                 <a:solidFill>
                   <a:srgbClr val="000000"/>
                 </a:solidFill>
@@ -26141,14 +26141,14 @@
           </a:ln>
           <a:extLst>
             <a:ext uri="{909E8E84-426E-40dd-AFC4-6F175D3DCCD1}">
-              <a14:hiddenFill xmlns="" xmlns:a14="http://schemas.microsoft.com/office/drawing/2010/main">
+              <a14:hiddenFill xmlns:a14="http://schemas.microsoft.com/office/drawing/2010/main" xmlns="">
                 <a:solidFill>
                   <a:srgbClr val="FFFFFF"/>
                 </a:solidFill>
               </a14:hiddenFill>
             </a:ext>
             <a:ext uri="{91240B29-F687-4f45-9708-019B960494DF}">
-              <a14:hiddenLine xmlns="" xmlns:a14="http://schemas.microsoft.com/office/drawing/2010/main" w="9525">
+              <a14:hiddenLine xmlns:a14="http://schemas.microsoft.com/office/drawing/2010/main" xmlns="" w="9525">
                 <a:solidFill>
                   <a:srgbClr val="000000"/>
                 </a:solidFill>
@@ -26787,14 +26787,14 @@
             </a:ln>
             <a:extLst>
               <a:ext uri="{909E8E84-426E-40dd-AFC4-6F175D3DCCD1}">
-                <a14:hiddenFill xmlns="" xmlns:a14="http://schemas.microsoft.com/office/drawing/2010/main">
+                <a14:hiddenFill xmlns:a14="http://schemas.microsoft.com/office/drawing/2010/main" xmlns="">
                   <a:solidFill>
                     <a:srgbClr val="FFFFFF"/>
                   </a:solidFill>
                 </a14:hiddenFill>
               </a:ext>
               <a:ext uri="{91240B29-F687-4f45-9708-019B960494DF}">
-                <a14:hiddenLine xmlns="" xmlns:a14="http://schemas.microsoft.com/office/drawing/2010/main" w="9525">
+                <a14:hiddenLine xmlns:a14="http://schemas.microsoft.com/office/drawing/2010/main" xmlns="" w="9525">
                   <a:solidFill>
                     <a:srgbClr val="000000"/>
                   </a:solidFill>
@@ -26898,14 +26898,14 @@
           </a:ln>
           <a:extLst>
             <a:ext uri="{909E8E84-426E-40dd-AFC4-6F175D3DCCD1}">
-              <a14:hiddenFill xmlns="" xmlns:a14="http://schemas.microsoft.com/office/drawing/2010/main">
+              <a14:hiddenFill xmlns:a14="http://schemas.microsoft.com/office/drawing/2010/main" xmlns="">
                 <a:solidFill>
                   <a:srgbClr val="FFFFFF"/>
                 </a:solidFill>
               </a14:hiddenFill>
             </a:ext>
             <a:ext uri="{91240B29-F687-4f45-9708-019B960494DF}">
-              <a14:hiddenLine xmlns="" xmlns:a14="http://schemas.microsoft.com/office/drawing/2010/main" w="9525">
+              <a14:hiddenLine xmlns:a14="http://schemas.microsoft.com/office/drawing/2010/main" xmlns="" w="9525">
                 <a:solidFill>
                   <a:srgbClr val="000000"/>
                 </a:solidFill>
@@ -27017,14 +27017,14 @@
           </a:ln>
           <a:extLst>
             <a:ext uri="{909E8E84-426E-40dd-AFC4-6F175D3DCCD1}">
-              <a14:hiddenFill xmlns="" xmlns:a14="http://schemas.microsoft.com/office/drawing/2010/main">
+              <a14:hiddenFill xmlns:a14="http://schemas.microsoft.com/office/drawing/2010/main" xmlns="">
                 <a:solidFill>
                   <a:srgbClr val="FFFFFF"/>
                 </a:solidFill>
               </a14:hiddenFill>
             </a:ext>
             <a:ext uri="{91240B29-F687-4f45-9708-019B960494DF}">
-              <a14:hiddenLine xmlns="" xmlns:a14="http://schemas.microsoft.com/office/drawing/2010/main" w="9525">
+              <a14:hiddenLine xmlns:a14="http://schemas.microsoft.com/office/drawing/2010/main" xmlns="" w="9525">
                 <a:solidFill>
                   <a:srgbClr val="000000"/>
                 </a:solidFill>
@@ -27512,14 +27512,14 @@
           </a:ln>
           <a:extLst>
             <a:ext uri="{909E8E84-426E-40dd-AFC4-6F175D3DCCD1}">
-              <a14:hiddenFill xmlns="" xmlns:a14="http://schemas.microsoft.com/office/drawing/2010/main">
+              <a14:hiddenFill xmlns:a14="http://schemas.microsoft.com/office/drawing/2010/main" xmlns="">
                 <a:solidFill>
                   <a:srgbClr val="FFFFFF"/>
                 </a:solidFill>
               </a14:hiddenFill>
             </a:ext>
             <a:ext uri="{91240B29-F687-4f45-9708-019B960494DF}">
-              <a14:hiddenLine xmlns="" xmlns:a14="http://schemas.microsoft.com/office/drawing/2010/main" w="9525">
+              <a14:hiddenLine xmlns:a14="http://schemas.microsoft.com/office/drawing/2010/main" xmlns="" w="9525">
                 <a:solidFill>
                   <a:srgbClr val="000000"/>
                 </a:solidFill>
@@ -27623,14 +27623,14 @@
           </a:ln>
           <a:extLst>
             <a:ext uri="{909E8E84-426E-40dd-AFC4-6F175D3DCCD1}">
-              <a14:hiddenFill xmlns="" xmlns:a14="http://schemas.microsoft.com/office/drawing/2010/main">
+              <a14:hiddenFill xmlns:a14="http://schemas.microsoft.com/office/drawing/2010/main" xmlns="">
                 <a:solidFill>
                   <a:srgbClr val="FFFFFF"/>
                 </a:solidFill>
               </a14:hiddenFill>
             </a:ext>
             <a:ext uri="{91240B29-F687-4f45-9708-019B960494DF}">
-              <a14:hiddenLine xmlns="" xmlns:a14="http://schemas.microsoft.com/office/drawing/2010/main" w="9525">
+              <a14:hiddenLine xmlns:a14="http://schemas.microsoft.com/office/drawing/2010/main" xmlns="" w="9525">
                 <a:solidFill>
                   <a:srgbClr val="000000"/>
                 </a:solidFill>
@@ -29718,14 +29718,14 @@
           </a:ln>
           <a:extLst>
             <a:ext uri="{909E8E84-426E-40dd-AFC4-6F175D3DCCD1}">
-              <a14:hiddenFill xmlns="" xmlns:a14="http://schemas.microsoft.com/office/drawing/2010/main">
+              <a14:hiddenFill xmlns:a14="http://schemas.microsoft.com/office/drawing/2010/main" xmlns="">
                 <a:solidFill>
                   <a:srgbClr val="FFFFFF"/>
                 </a:solidFill>
               </a14:hiddenFill>
             </a:ext>
             <a:ext uri="{91240B29-F687-4f45-9708-019B960494DF}">
-              <a14:hiddenLine xmlns="" xmlns:a14="http://schemas.microsoft.com/office/drawing/2010/main" w="9525">
+              <a14:hiddenLine xmlns:a14="http://schemas.microsoft.com/office/drawing/2010/main" xmlns="" w="9525">
                 <a:solidFill>
                   <a:srgbClr val="000000"/>
                 </a:solidFill>
@@ -29887,14 +29887,14 @@
           </a:ln>
           <a:extLst>
             <a:ext uri="{909E8E84-426E-40dd-AFC4-6F175D3DCCD1}">
-              <a14:hiddenFill xmlns="" xmlns:a14="http://schemas.microsoft.com/office/drawing/2010/main">
+              <a14:hiddenFill xmlns:a14="http://schemas.microsoft.com/office/drawing/2010/main" xmlns="">
                 <a:solidFill>
                   <a:srgbClr val="FFFFFF"/>
                 </a:solidFill>
               </a14:hiddenFill>
             </a:ext>
             <a:ext uri="{91240B29-F687-4f45-9708-019B960494DF}">
-              <a14:hiddenLine xmlns="" xmlns:a14="http://schemas.microsoft.com/office/drawing/2010/main" w="9525">
+              <a14:hiddenLine xmlns:a14="http://schemas.microsoft.com/office/drawing/2010/main" xmlns="" w="9525">
                 <a:solidFill>
                   <a:srgbClr val="000000"/>
                 </a:solidFill>
@@ -30551,14 +30551,14 @@
           </a:ln>
           <a:extLst>
             <a:ext uri="{909E8E84-426E-40dd-AFC4-6F175D3DCCD1}">
-              <a14:hiddenFill xmlns="" xmlns:a14="http://schemas.microsoft.com/office/drawing/2010/main">
+              <a14:hiddenFill xmlns:a14="http://schemas.microsoft.com/office/drawing/2010/main" xmlns="">
                 <a:solidFill>
                   <a:srgbClr val="FFFFFF"/>
                 </a:solidFill>
               </a14:hiddenFill>
             </a:ext>
             <a:ext uri="{91240B29-F687-4f45-9708-019B960494DF}">
-              <a14:hiddenLine xmlns="" xmlns:a14="http://schemas.microsoft.com/office/drawing/2010/main" w="9525">
+              <a14:hiddenLine xmlns:a14="http://schemas.microsoft.com/office/drawing/2010/main" xmlns="" w="9525">
                 <a:solidFill>
                   <a:srgbClr val="000000"/>
                 </a:solidFill>
@@ -31309,14 +31309,14 @@
           </a:ln>
           <a:extLst>
             <a:ext uri="{909E8E84-426E-40dd-AFC4-6F175D3DCCD1}">
-              <a14:hiddenFill xmlns="" xmlns:a14="http://schemas.microsoft.com/office/drawing/2010/main">
+              <a14:hiddenFill xmlns:a14="http://schemas.microsoft.com/office/drawing/2010/main" xmlns="">
                 <a:solidFill>
                   <a:srgbClr val="FFFFFF"/>
                 </a:solidFill>
               </a14:hiddenFill>
             </a:ext>
             <a:ext uri="{91240B29-F687-4f45-9708-019B960494DF}">
-              <a14:hiddenLine xmlns="" xmlns:a14="http://schemas.microsoft.com/office/drawing/2010/main" w="9525">
+              <a14:hiddenLine xmlns:a14="http://schemas.microsoft.com/office/drawing/2010/main" xmlns="" w="9525">
                 <a:solidFill>
                   <a:srgbClr val="000000"/>
                 </a:solidFill>
@@ -34361,14 +34361,14 @@
           </a:ln>
           <a:extLst>
             <a:ext uri="{909E8E84-426E-40dd-AFC4-6F175D3DCCD1}">
-              <a14:hiddenFill xmlns="" xmlns:a14="http://schemas.microsoft.com/office/drawing/2010/main">
+              <a14:hiddenFill xmlns:a14="http://schemas.microsoft.com/office/drawing/2010/main" xmlns="">
                 <a:solidFill>
                   <a:srgbClr val="FFFFFF"/>
                 </a:solidFill>
               </a14:hiddenFill>
             </a:ext>
             <a:ext uri="{91240B29-F687-4f45-9708-019B960494DF}">
-              <a14:hiddenLine xmlns="" xmlns:a14="http://schemas.microsoft.com/office/drawing/2010/main" w="9525">
+              <a14:hiddenLine xmlns:a14="http://schemas.microsoft.com/office/drawing/2010/main" xmlns="" w="9525">
                 <a:solidFill>
                   <a:srgbClr val="000000"/>
                 </a:solidFill>
@@ -34378,7 +34378,7 @@
               </a14:hiddenLine>
             </a:ext>
             <a:ext uri="{FAA26D3D-D897-4be2-8F04-BA451C77F1D7}">
-              <ma14:placeholderFlag xmlns="" xmlns:ma14="http://schemas.microsoft.com/office/mac/drawingml/2011/main" val="1"/>
+              <ma14:placeholderFlag xmlns:ma14="http://schemas.microsoft.com/office/mac/drawingml/2011/main" xmlns="" val="1"/>
             </a:ext>
           </a:extLst>
         </p:spPr>
@@ -34423,14 +34423,14 @@
           </a:ln>
           <a:extLst>
             <a:ext uri="{909E8E84-426E-40dd-AFC4-6F175D3DCCD1}">
-              <a14:hiddenFill xmlns="" xmlns:a14="http://schemas.microsoft.com/office/drawing/2010/main">
+              <a14:hiddenFill xmlns:a14="http://schemas.microsoft.com/office/drawing/2010/main" xmlns="">
                 <a:solidFill>
                   <a:srgbClr val="FFFFFF"/>
                 </a:solidFill>
               </a14:hiddenFill>
             </a:ext>
             <a:ext uri="{91240B29-F687-4f45-9708-019B960494DF}">
-              <a14:hiddenLine xmlns="" xmlns:a14="http://schemas.microsoft.com/office/drawing/2010/main" w="9525">
+              <a14:hiddenLine xmlns:a14="http://schemas.microsoft.com/office/drawing/2010/main" xmlns="" w="9525">
                 <a:solidFill>
                   <a:srgbClr val="000000"/>
                 </a:solidFill>
@@ -34440,7 +34440,7 @@
               </a14:hiddenLine>
             </a:ext>
             <a:ext uri="{FAA26D3D-D897-4be2-8F04-BA451C77F1D7}">
-              <ma14:placeholderFlag xmlns="" xmlns:ma14="http://schemas.microsoft.com/office/mac/drawingml/2011/main" val="1"/>
+              <ma14:placeholderFlag xmlns:ma14="http://schemas.microsoft.com/office/mac/drawingml/2011/main" xmlns="" val="1"/>
             </a:ext>
           </a:extLst>
         </p:spPr>
@@ -34511,14 +34511,14 @@
           </a:ln>
           <a:extLst>
             <a:ext uri="{909E8E84-426E-40dd-AFC4-6F175D3DCCD1}">
-              <a14:hiddenFill xmlns="" xmlns:a14="http://schemas.microsoft.com/office/drawing/2010/main">
+              <a14:hiddenFill xmlns:a14="http://schemas.microsoft.com/office/drawing/2010/main" xmlns="">
                 <a:solidFill>
                   <a:srgbClr val="FFFFFF"/>
                 </a:solidFill>
               </a14:hiddenFill>
             </a:ext>
             <a:ext uri="{91240B29-F687-4f45-9708-019B960494DF}">
-              <a14:hiddenLine xmlns="" xmlns:a14="http://schemas.microsoft.com/office/drawing/2010/main" w="9525">
+              <a14:hiddenLine xmlns:a14="http://schemas.microsoft.com/office/drawing/2010/main" xmlns="" w="9525">
                 <a:solidFill>
                   <a:srgbClr val="000000"/>
                 </a:solidFill>
@@ -35202,14 +35202,14 @@
           </a:ln>
           <a:extLst>
             <a:ext uri="{909E8E84-426E-40dd-AFC4-6F175D3DCCD1}">
-              <a14:hiddenFill xmlns="" xmlns:a14="http://schemas.microsoft.com/office/drawing/2010/main">
+              <a14:hiddenFill xmlns:a14="http://schemas.microsoft.com/office/drawing/2010/main" xmlns="">
                 <a:solidFill>
                   <a:srgbClr val="FFFFFF"/>
                 </a:solidFill>
               </a14:hiddenFill>
             </a:ext>
             <a:ext uri="{91240B29-F687-4f45-9708-019B960494DF}">
-              <a14:hiddenLine xmlns="" xmlns:a14="http://schemas.microsoft.com/office/drawing/2010/main" w="9525">
+              <a14:hiddenLine xmlns:a14="http://schemas.microsoft.com/office/drawing/2010/main" xmlns="" w="9525">
                 <a:solidFill>
                   <a:srgbClr val="000000"/>
                 </a:solidFill>
@@ -35219,7 +35219,7 @@
               </a14:hiddenLine>
             </a:ext>
             <a:ext uri="{FAA26D3D-D897-4be2-8F04-BA451C77F1D7}">
-              <ma14:placeholderFlag xmlns="" xmlns:ma14="http://schemas.microsoft.com/office/mac/drawingml/2011/main" val="1"/>
+              <ma14:placeholderFlag xmlns:ma14="http://schemas.microsoft.com/office/mac/drawingml/2011/main" xmlns="" val="1"/>
             </a:ext>
           </a:extLst>
         </p:spPr>
@@ -35289,14 +35289,14 @@
           </a:ln>
           <a:extLst>
             <a:ext uri="{909E8E84-426E-40dd-AFC4-6F175D3DCCD1}">
-              <a14:hiddenFill xmlns="" xmlns:a14="http://schemas.microsoft.com/office/drawing/2010/main">
+              <a14:hiddenFill xmlns:a14="http://schemas.microsoft.com/office/drawing/2010/main" xmlns="">
                 <a:solidFill>
                   <a:srgbClr val="FFFFFF"/>
                 </a:solidFill>
               </a14:hiddenFill>
             </a:ext>
             <a:ext uri="{91240B29-F687-4f45-9708-019B960494DF}">
-              <a14:hiddenLine xmlns="" xmlns:a14="http://schemas.microsoft.com/office/drawing/2010/main" w="9525">
+              <a14:hiddenLine xmlns:a14="http://schemas.microsoft.com/office/drawing/2010/main" xmlns="" w="9525">
                 <a:solidFill>
                   <a:srgbClr val="000000"/>
                 </a:solidFill>
@@ -37226,128 +37226,18 @@
                 </a:solidFill>
                 <a:latin typeface="+mj-lt"/>
               </a:rPr>
-              <a:t>What are trainees needing?</a:t>
-            </a:r>
-          </a:p>
-          <a:p>
-            <a:pPr defTabSz="600944" fontAlgn="auto">
-              <a:spcBef>
-                <a:spcPts val="0"/>
-              </a:spcBef>
-              <a:spcAft>
-                <a:spcPts val="0"/>
-              </a:spcAft>
-              <a:defRPr/>
-            </a:pPr>
-            <a:r>
-              <a:rPr lang="fi-FI" sz="1000" dirty="0">
+              <a:t>What are trainees </a:t>
+            </a:r>
+            <a:r>
+              <a:rPr lang="en-US" sz="1600">
                 <a:solidFill>
                   <a:schemeClr val="tx1"/>
                 </a:solidFill>
-                <a:latin typeface="SharpSansNo1-Light"/>
-                <a:cs typeface="SharpSansNo1-Light"/>
+                <a:latin typeface="+mj-lt"/>
               </a:rPr>
-              <a:t>(How </a:t>
-            </a:r>
-            <a:r>
-              <a:rPr lang="fi-FI" sz="1000" dirty="0" err="1">
-                <a:solidFill>
-                  <a:schemeClr val="tx1"/>
-                </a:solidFill>
-                <a:latin typeface="SharpSansNo1-Light"/>
-                <a:cs typeface="SharpSansNo1-Light"/>
-              </a:rPr>
-              <a:t>does</a:t>
-            </a:r>
-            <a:r>
-              <a:rPr lang="fi-FI" sz="1000" dirty="0">
-                <a:solidFill>
-                  <a:schemeClr val="tx1"/>
-                </a:solidFill>
-                <a:latin typeface="SharpSansNo1-Light"/>
-                <a:cs typeface="SharpSansNo1-Light"/>
-              </a:rPr>
-              <a:t> it </a:t>
-            </a:r>
-            <a:r>
-              <a:rPr lang="fi-FI" sz="1000" dirty="0" err="1">
-                <a:solidFill>
-                  <a:schemeClr val="tx1"/>
-                </a:solidFill>
-                <a:latin typeface="SharpSansNo1-Light"/>
-                <a:cs typeface="SharpSansNo1-Light"/>
-              </a:rPr>
-              <a:t>fit</a:t>
-            </a:r>
-            <a:r>
-              <a:rPr lang="fi-FI" sz="1000" dirty="0">
-                <a:solidFill>
-                  <a:schemeClr val="tx1"/>
-                </a:solidFill>
-                <a:latin typeface="SharpSansNo1-Light"/>
-                <a:cs typeface="SharpSansNo1-Light"/>
-              </a:rPr>
-              <a:t> </a:t>
-            </a:r>
-            <a:r>
-              <a:rPr lang="fi-FI" sz="1000" dirty="0" err="1">
-                <a:solidFill>
-                  <a:schemeClr val="tx1"/>
-                </a:solidFill>
-                <a:latin typeface="SharpSansNo1-Light"/>
-                <a:cs typeface="SharpSansNo1-Light"/>
-              </a:rPr>
-              <a:t>our</a:t>
-            </a:r>
-            <a:r>
-              <a:rPr lang="fi-FI" sz="1000" dirty="0">
-                <a:solidFill>
-                  <a:schemeClr val="tx1"/>
-                </a:solidFill>
-                <a:latin typeface="SharpSansNo1-Light"/>
-                <a:cs typeface="SharpSansNo1-Light"/>
-              </a:rPr>
-              <a:t> </a:t>
-            </a:r>
-            <a:r>
-              <a:rPr lang="fi-FI" sz="1000" dirty="0" err="1">
-                <a:solidFill>
-                  <a:schemeClr val="tx1"/>
-                </a:solidFill>
-                <a:latin typeface="SharpSansNo1-Light"/>
-                <a:cs typeface="SharpSansNo1-Light"/>
-              </a:rPr>
-              <a:t>strategy</a:t>
-            </a:r>
-            <a:r>
-              <a:rPr lang="fi-FI" sz="1000" dirty="0">
-                <a:solidFill>
-                  <a:schemeClr val="tx1"/>
-                </a:solidFill>
-                <a:latin typeface="SharpSansNo1-Light"/>
-                <a:cs typeface="SharpSansNo1-Light"/>
-              </a:rPr>
-              <a:t>?)</a:t>
-            </a:r>
-            <a:endParaRPr lang="en-US" sz="1000" dirty="0">
-              <a:solidFill>
-                <a:schemeClr val="tx1"/>
-              </a:solidFill>
-              <a:latin typeface="SharpSansNo1-Light"/>
-              <a:cs typeface="SharpSansNo1-Light"/>
-            </a:endParaRPr>
-          </a:p>
-          <a:p>
-            <a:pPr defTabSz="600944" fontAlgn="auto">
-              <a:spcBef>
-                <a:spcPts val="0"/>
-              </a:spcBef>
-              <a:spcAft>
-                <a:spcPts val="0"/>
-              </a:spcAft>
-              <a:defRPr/>
-            </a:pPr>
-            <a:endParaRPr lang="en-US" sz="1000" dirty="0">
+              <a:t>needing?</a:t>
+            </a:r>
+            <a:endParaRPr lang="en-US" sz="1600" dirty="0">
               <a:solidFill>
                 <a:schemeClr val="tx1"/>
               </a:solidFill>
@@ -37407,14 +37297,14 @@
             </a:ln>
             <a:extLst>
               <a:ext uri="{909E8E84-426E-40dd-AFC4-6F175D3DCCD1}">
-                <a14:hiddenFill xmlns="" xmlns:a14="http://schemas.microsoft.com/office/drawing/2010/main">
+                <a14:hiddenFill xmlns:a14="http://schemas.microsoft.com/office/drawing/2010/main" xmlns="">
                   <a:solidFill>
                     <a:srgbClr val="FFFFFF"/>
                   </a:solidFill>
                 </a14:hiddenFill>
               </a:ext>
               <a:ext uri="{91240B29-F687-4f45-9708-019B960494DF}">
-                <a14:hiddenLine xmlns="" xmlns:a14="http://schemas.microsoft.com/office/drawing/2010/main" w="9525">
+                <a14:hiddenLine xmlns:a14="http://schemas.microsoft.com/office/drawing/2010/main" xmlns="" w="9525">
                   <a:solidFill>
                     <a:srgbClr val="000000"/>
                   </a:solidFill>

</xml_diff>